<commit_message>
Revised Figures. Added V587 to MOI fig.
</commit_message>
<xml_diff>
--- a/figures/Figures.pptx
+++ b/figures/Figures.pptx
@@ -2,14 +2,14 @@
 <file path=ppt/presentation.xml><?xml version="1.0" encoding="utf-8"?>
 <p:presentation xmlns:a="http://schemas.openxmlformats.org/drawingml/2006/main" xmlns:r="http://schemas.openxmlformats.org/officeDocument/2006/relationships" xmlns:p="http://schemas.openxmlformats.org/presentationml/2006/main" saveSubsetFonts="1">
   <p:sldMasterIdLst>
-    <p:sldMasterId id="2147483660" r:id="rId1"/>
+    <p:sldMasterId id="2147483672" r:id="rId1"/>
   </p:sldMasterIdLst>
   <p:sldIdLst>
     <p:sldId id="256" r:id="rId2"/>
     <p:sldId id="258" r:id="rId3"/>
     <p:sldId id="257" r:id="rId4"/>
   </p:sldIdLst>
-  <p:sldSz cx="18562638" cy="18288000"/>
+  <p:sldSz cx="18562638" cy="22860000"/>
   <p:notesSz cx="6858000" cy="9144000"/>
   <p:defaultTextStyle>
     <a:defPPr>
@@ -143,8 +143,8 @@
         </p:nvSpPr>
         <p:spPr>
           <a:xfrm>
-            <a:off x="1392198" y="2992968"/>
-            <a:ext cx="15778242" cy="6366933"/>
+            <a:off x="1392198" y="3741210"/>
+            <a:ext cx="15778242" cy="7958667"/>
           </a:xfrm>
         </p:spPr>
         <p:txBody>
@@ -175,8 +175,8 @@
         </p:nvSpPr>
         <p:spPr>
           <a:xfrm>
-            <a:off x="2320330" y="9605435"/>
-            <a:ext cx="13921979" cy="4415365"/>
+            <a:off x="2320330" y="12006793"/>
+            <a:ext cx="13921979" cy="5519207"/>
           </a:xfrm>
         </p:spPr>
         <p:txBody>
@@ -245,7 +245,7 @@
           <a:p>
             <a:fld id="{AAEC4A40-A4AF-4D07-B5DE-5231CAC44A4C}" type="datetimeFigureOut">
               <a:rPr lang="en-US" smtClean="0"/>
-              <a:t>10/30/2020</a:t>
+              <a:t>11/9/2020</a:t>
             </a:fld>
             <a:endParaRPr lang="en-US"/>
           </a:p>
@@ -296,7 +296,7 @@
     </p:spTree>
     <p:extLst>
       <p:ext uri="{BB962C8B-B14F-4D97-AF65-F5344CB8AC3E}">
-        <p14:creationId xmlns:p14="http://schemas.microsoft.com/office/powerpoint/2010/main" val="354886882"/>
+        <p14:creationId xmlns:p14="http://schemas.microsoft.com/office/powerpoint/2010/main" val="862145719"/>
       </p:ext>
     </p:extLst>
   </p:cSld>
@@ -415,7 +415,7 @@
           <a:p>
             <a:fld id="{AAEC4A40-A4AF-4D07-B5DE-5231CAC44A4C}" type="datetimeFigureOut">
               <a:rPr lang="en-US" smtClean="0"/>
-              <a:t>10/30/2020</a:t>
+              <a:t>11/9/2020</a:t>
             </a:fld>
             <a:endParaRPr lang="en-US"/>
           </a:p>
@@ -466,7 +466,7 @@
     </p:spTree>
     <p:extLst>
       <p:ext uri="{BB962C8B-B14F-4D97-AF65-F5344CB8AC3E}">
-        <p14:creationId xmlns:p14="http://schemas.microsoft.com/office/powerpoint/2010/main" val="2606999420"/>
+        <p14:creationId xmlns:p14="http://schemas.microsoft.com/office/powerpoint/2010/main" val="2381234012"/>
       </p:ext>
     </p:extLst>
   </p:cSld>
@@ -505,8 +505,8 @@
         </p:nvSpPr>
         <p:spPr>
           <a:xfrm>
-            <a:off x="13283889" y="973667"/>
-            <a:ext cx="4002569" cy="15498235"/>
+            <a:off x="13283889" y="1217084"/>
+            <a:ext cx="4002569" cy="19372793"/>
           </a:xfrm>
         </p:spPr>
         <p:txBody>
@@ -533,8 +533,8 @@
         </p:nvSpPr>
         <p:spPr>
           <a:xfrm>
-            <a:off x="1276183" y="973667"/>
-            <a:ext cx="11775673" cy="15498235"/>
+            <a:off x="1276183" y="1217084"/>
+            <a:ext cx="11775673" cy="19372793"/>
           </a:xfrm>
         </p:spPr>
         <p:txBody>
@@ -595,7 +595,7 @@
           <a:p>
             <a:fld id="{AAEC4A40-A4AF-4D07-B5DE-5231CAC44A4C}" type="datetimeFigureOut">
               <a:rPr lang="en-US" smtClean="0"/>
-              <a:t>10/30/2020</a:t>
+              <a:t>11/9/2020</a:t>
             </a:fld>
             <a:endParaRPr lang="en-US"/>
           </a:p>
@@ -646,7 +646,7 @@
     </p:spTree>
     <p:extLst>
       <p:ext uri="{BB962C8B-B14F-4D97-AF65-F5344CB8AC3E}">
-        <p14:creationId xmlns:p14="http://schemas.microsoft.com/office/powerpoint/2010/main" val="2955444390"/>
+        <p14:creationId xmlns:p14="http://schemas.microsoft.com/office/powerpoint/2010/main" val="485984922"/>
       </p:ext>
     </p:extLst>
   </p:cSld>
@@ -765,7 +765,7 @@
           <a:p>
             <a:fld id="{AAEC4A40-A4AF-4D07-B5DE-5231CAC44A4C}" type="datetimeFigureOut">
               <a:rPr lang="en-US" smtClean="0"/>
-              <a:t>10/30/2020</a:t>
+              <a:t>11/9/2020</a:t>
             </a:fld>
             <a:endParaRPr lang="en-US"/>
           </a:p>
@@ -816,7 +816,7 @@
     </p:spTree>
     <p:extLst>
       <p:ext uri="{BB962C8B-B14F-4D97-AF65-F5344CB8AC3E}">
-        <p14:creationId xmlns:p14="http://schemas.microsoft.com/office/powerpoint/2010/main" val="2763870586"/>
+        <p14:creationId xmlns:p14="http://schemas.microsoft.com/office/powerpoint/2010/main" val="3912785628"/>
       </p:ext>
     </p:extLst>
   </p:cSld>
@@ -855,8 +855,8 @@
         </p:nvSpPr>
         <p:spPr>
           <a:xfrm>
-            <a:off x="1266514" y="4559305"/>
-            <a:ext cx="16010275" cy="7607299"/>
+            <a:off x="1266514" y="5699132"/>
+            <a:ext cx="16010275" cy="9509123"/>
           </a:xfrm>
         </p:spPr>
         <p:txBody>
@@ -887,8 +887,8 @@
         </p:nvSpPr>
         <p:spPr>
           <a:xfrm>
-            <a:off x="1266514" y="12238572"/>
-            <a:ext cx="16010275" cy="4000499"/>
+            <a:off x="1266514" y="15298215"/>
+            <a:ext cx="16010275" cy="5000623"/>
           </a:xfrm>
         </p:spPr>
         <p:txBody>
@@ -1009,7 +1009,7 @@
           <a:p>
             <a:fld id="{AAEC4A40-A4AF-4D07-B5DE-5231CAC44A4C}" type="datetimeFigureOut">
               <a:rPr lang="en-US" smtClean="0"/>
-              <a:t>10/30/2020</a:t>
+              <a:t>11/9/2020</a:t>
             </a:fld>
             <a:endParaRPr lang="en-US"/>
           </a:p>
@@ -1060,7 +1060,7 @@
     </p:spTree>
     <p:extLst>
       <p:ext uri="{BB962C8B-B14F-4D97-AF65-F5344CB8AC3E}">
-        <p14:creationId xmlns:p14="http://schemas.microsoft.com/office/powerpoint/2010/main" val="2135694281"/>
+        <p14:creationId xmlns:p14="http://schemas.microsoft.com/office/powerpoint/2010/main" val="2003526376"/>
       </p:ext>
     </p:extLst>
   </p:cSld>
@@ -1122,8 +1122,8 @@
         </p:nvSpPr>
         <p:spPr>
           <a:xfrm>
-            <a:off x="1276181" y="4868333"/>
-            <a:ext cx="7889121" cy="11603568"/>
+            <a:off x="1276181" y="6085417"/>
+            <a:ext cx="7889121" cy="14504460"/>
           </a:xfrm>
         </p:spPr>
         <p:txBody>
@@ -1179,8 +1179,8 @@
         </p:nvSpPr>
         <p:spPr>
           <a:xfrm>
-            <a:off x="9397336" y="4868333"/>
-            <a:ext cx="7889121" cy="11603568"/>
+            <a:off x="9397336" y="6085417"/>
+            <a:ext cx="7889121" cy="14504460"/>
           </a:xfrm>
         </p:spPr>
         <p:txBody>
@@ -1241,7 +1241,7 @@
           <a:p>
             <a:fld id="{AAEC4A40-A4AF-4D07-B5DE-5231CAC44A4C}" type="datetimeFigureOut">
               <a:rPr lang="en-US" smtClean="0"/>
-              <a:t>10/30/2020</a:t>
+              <a:t>11/9/2020</a:t>
             </a:fld>
             <a:endParaRPr lang="en-US"/>
           </a:p>
@@ -1292,7 +1292,7 @@
     </p:spTree>
     <p:extLst>
       <p:ext uri="{BB962C8B-B14F-4D97-AF65-F5344CB8AC3E}">
-        <p14:creationId xmlns:p14="http://schemas.microsoft.com/office/powerpoint/2010/main" val="1862513559"/>
+        <p14:creationId xmlns:p14="http://schemas.microsoft.com/office/powerpoint/2010/main" val="480309638"/>
       </p:ext>
     </p:extLst>
   </p:cSld>
@@ -1331,8 +1331,8 @@
         </p:nvSpPr>
         <p:spPr>
           <a:xfrm>
-            <a:off x="1278599" y="973671"/>
-            <a:ext cx="16010275" cy="3534835"/>
+            <a:off x="1278599" y="1217089"/>
+            <a:ext cx="16010275" cy="4418543"/>
           </a:xfrm>
         </p:spPr>
         <p:txBody>
@@ -1359,8 +1359,8 @@
         </p:nvSpPr>
         <p:spPr>
           <a:xfrm>
-            <a:off x="1278601" y="4483101"/>
-            <a:ext cx="7852865" cy="2197099"/>
+            <a:off x="1278601" y="5603877"/>
+            <a:ext cx="7852865" cy="2746373"/>
           </a:xfrm>
         </p:spPr>
         <p:txBody>
@@ -1424,8 +1424,8 @@
         </p:nvSpPr>
         <p:spPr>
           <a:xfrm>
-            <a:off x="1278601" y="6680200"/>
-            <a:ext cx="7852865" cy="9825568"/>
+            <a:off x="1278601" y="8350250"/>
+            <a:ext cx="7852865" cy="12281960"/>
           </a:xfrm>
         </p:spPr>
         <p:txBody>
@@ -1481,8 +1481,8 @@
         </p:nvSpPr>
         <p:spPr>
           <a:xfrm>
-            <a:off x="9397336" y="4483101"/>
-            <a:ext cx="7891539" cy="2197099"/>
+            <a:off x="9397336" y="5603877"/>
+            <a:ext cx="7891539" cy="2746373"/>
           </a:xfrm>
         </p:spPr>
         <p:txBody>
@@ -1546,8 +1546,8 @@
         </p:nvSpPr>
         <p:spPr>
           <a:xfrm>
-            <a:off x="9397336" y="6680200"/>
-            <a:ext cx="7891539" cy="9825568"/>
+            <a:off x="9397336" y="8350250"/>
+            <a:ext cx="7891539" cy="12281960"/>
           </a:xfrm>
         </p:spPr>
         <p:txBody>
@@ -1608,7 +1608,7 @@
           <a:p>
             <a:fld id="{AAEC4A40-A4AF-4D07-B5DE-5231CAC44A4C}" type="datetimeFigureOut">
               <a:rPr lang="en-US" smtClean="0"/>
-              <a:t>10/30/2020</a:t>
+              <a:t>11/9/2020</a:t>
             </a:fld>
             <a:endParaRPr lang="en-US"/>
           </a:p>
@@ -1659,7 +1659,7 @@
     </p:spTree>
     <p:extLst>
       <p:ext uri="{BB962C8B-B14F-4D97-AF65-F5344CB8AC3E}">
-        <p14:creationId xmlns:p14="http://schemas.microsoft.com/office/powerpoint/2010/main" val="3731934643"/>
+        <p14:creationId xmlns:p14="http://schemas.microsoft.com/office/powerpoint/2010/main" val="2587207255"/>
       </p:ext>
     </p:extLst>
   </p:cSld>
@@ -1726,7 +1726,7 @@
           <a:p>
             <a:fld id="{AAEC4A40-A4AF-4D07-B5DE-5231CAC44A4C}" type="datetimeFigureOut">
               <a:rPr lang="en-US" smtClean="0"/>
-              <a:t>10/30/2020</a:t>
+              <a:t>11/9/2020</a:t>
             </a:fld>
             <a:endParaRPr lang="en-US"/>
           </a:p>
@@ -1777,7 +1777,7 @@
     </p:spTree>
     <p:extLst>
       <p:ext uri="{BB962C8B-B14F-4D97-AF65-F5344CB8AC3E}">
-        <p14:creationId xmlns:p14="http://schemas.microsoft.com/office/powerpoint/2010/main" val="91197003"/>
+        <p14:creationId xmlns:p14="http://schemas.microsoft.com/office/powerpoint/2010/main" val="3361792246"/>
       </p:ext>
     </p:extLst>
   </p:cSld>
@@ -1821,7 +1821,7 @@
           <a:p>
             <a:fld id="{AAEC4A40-A4AF-4D07-B5DE-5231CAC44A4C}" type="datetimeFigureOut">
               <a:rPr lang="en-US" smtClean="0"/>
-              <a:t>10/30/2020</a:t>
+              <a:t>11/9/2020</a:t>
             </a:fld>
             <a:endParaRPr lang="en-US"/>
           </a:p>
@@ -1872,7 +1872,7 @@
     </p:spTree>
     <p:extLst>
       <p:ext uri="{BB962C8B-B14F-4D97-AF65-F5344CB8AC3E}">
-        <p14:creationId xmlns:p14="http://schemas.microsoft.com/office/powerpoint/2010/main" val="2739977646"/>
+        <p14:creationId xmlns:p14="http://schemas.microsoft.com/office/powerpoint/2010/main" val="3131979108"/>
       </p:ext>
     </p:extLst>
   </p:cSld>
@@ -1911,8 +1911,8 @@
         </p:nvSpPr>
         <p:spPr>
           <a:xfrm>
-            <a:off x="1278599" y="1219200"/>
-            <a:ext cx="5986934" cy="4267200"/>
+            <a:off x="1278599" y="1524000"/>
+            <a:ext cx="5986934" cy="5334000"/>
           </a:xfrm>
         </p:spPr>
         <p:txBody>
@@ -1943,8 +1943,8 @@
         </p:nvSpPr>
         <p:spPr>
           <a:xfrm>
-            <a:off x="7891539" y="2633138"/>
-            <a:ext cx="9397335" cy="12996333"/>
+            <a:off x="7891539" y="3291422"/>
+            <a:ext cx="9397335" cy="16245417"/>
           </a:xfrm>
         </p:spPr>
         <p:txBody>
@@ -2028,8 +2028,8 @@
         </p:nvSpPr>
         <p:spPr>
           <a:xfrm>
-            <a:off x="1278599" y="5486400"/>
-            <a:ext cx="5986934" cy="10164235"/>
+            <a:off x="1278599" y="6858000"/>
+            <a:ext cx="5986934" cy="12705293"/>
           </a:xfrm>
         </p:spPr>
         <p:txBody>
@@ -2098,7 +2098,7 @@
           <a:p>
             <a:fld id="{AAEC4A40-A4AF-4D07-B5DE-5231CAC44A4C}" type="datetimeFigureOut">
               <a:rPr lang="en-US" smtClean="0"/>
-              <a:t>10/30/2020</a:t>
+              <a:t>11/9/2020</a:t>
             </a:fld>
             <a:endParaRPr lang="en-US"/>
           </a:p>
@@ -2149,7 +2149,7 @@
     </p:spTree>
     <p:extLst>
       <p:ext uri="{BB962C8B-B14F-4D97-AF65-F5344CB8AC3E}">
-        <p14:creationId xmlns:p14="http://schemas.microsoft.com/office/powerpoint/2010/main" val="3307106657"/>
+        <p14:creationId xmlns:p14="http://schemas.microsoft.com/office/powerpoint/2010/main" val="1755363994"/>
       </p:ext>
     </p:extLst>
   </p:cSld>
@@ -2188,8 +2188,8 @@
         </p:nvSpPr>
         <p:spPr>
           <a:xfrm>
-            <a:off x="1278599" y="1219200"/>
-            <a:ext cx="5986934" cy="4267200"/>
+            <a:off x="1278599" y="1524000"/>
+            <a:ext cx="5986934" cy="5334000"/>
           </a:xfrm>
         </p:spPr>
         <p:txBody>
@@ -2220,8 +2220,8 @@
         </p:nvSpPr>
         <p:spPr>
           <a:xfrm>
-            <a:off x="7891539" y="2633138"/>
-            <a:ext cx="9397335" cy="12996333"/>
+            <a:off x="7891539" y="3291422"/>
+            <a:ext cx="9397335" cy="16245417"/>
           </a:xfrm>
         </p:spPr>
         <p:txBody>
@@ -2285,8 +2285,8 @@
         </p:nvSpPr>
         <p:spPr>
           <a:xfrm>
-            <a:off x="1278599" y="5486400"/>
-            <a:ext cx="5986934" cy="10164235"/>
+            <a:off x="1278599" y="6858000"/>
+            <a:ext cx="5986934" cy="12705293"/>
           </a:xfrm>
         </p:spPr>
         <p:txBody>
@@ -2355,7 +2355,7 @@
           <a:p>
             <a:fld id="{AAEC4A40-A4AF-4D07-B5DE-5231CAC44A4C}" type="datetimeFigureOut">
               <a:rPr lang="en-US" smtClean="0"/>
-              <a:t>10/30/2020</a:t>
+              <a:t>11/9/2020</a:t>
             </a:fld>
             <a:endParaRPr lang="en-US"/>
           </a:p>
@@ -2406,7 +2406,7 @@
     </p:spTree>
     <p:extLst>
       <p:ext uri="{BB962C8B-B14F-4D97-AF65-F5344CB8AC3E}">
-        <p14:creationId xmlns:p14="http://schemas.microsoft.com/office/powerpoint/2010/main" val="890154138"/>
+        <p14:creationId xmlns:p14="http://schemas.microsoft.com/office/powerpoint/2010/main" val="2106494430"/>
       </p:ext>
     </p:extLst>
   </p:cSld>
@@ -2450,8 +2450,8 @@
         </p:nvSpPr>
         <p:spPr>
           <a:xfrm>
-            <a:off x="1276182" y="973671"/>
-            <a:ext cx="16010275" cy="3534835"/>
+            <a:off x="1276182" y="1217089"/>
+            <a:ext cx="16010275" cy="4418543"/>
           </a:xfrm>
           <a:prstGeom prst="rect">
             <a:avLst/>
@@ -2483,8 +2483,8 @@
         </p:nvSpPr>
         <p:spPr>
           <a:xfrm>
-            <a:off x="1276182" y="4868333"/>
-            <a:ext cx="16010275" cy="11603568"/>
+            <a:off x="1276182" y="6085417"/>
+            <a:ext cx="16010275" cy="14504460"/>
           </a:xfrm>
           <a:prstGeom prst="rect">
             <a:avLst/>
@@ -2545,8 +2545,8 @@
         </p:nvSpPr>
         <p:spPr>
           <a:xfrm>
-            <a:off x="1276181" y="16950271"/>
-            <a:ext cx="4176594" cy="973667"/>
+            <a:off x="1276181" y="21187839"/>
+            <a:ext cx="4176594" cy="1217083"/>
           </a:xfrm>
           <a:prstGeom prst="rect">
             <a:avLst/>
@@ -2568,7 +2568,7 @@
           <a:p>
             <a:fld id="{AAEC4A40-A4AF-4D07-B5DE-5231CAC44A4C}" type="datetimeFigureOut">
               <a:rPr lang="en-US" smtClean="0"/>
-              <a:t>10/30/2020</a:t>
+              <a:t>11/9/2020</a:t>
             </a:fld>
             <a:endParaRPr lang="en-US"/>
           </a:p>
@@ -2586,8 +2586,8 @@
         </p:nvSpPr>
         <p:spPr>
           <a:xfrm>
-            <a:off x="6148874" y="16950271"/>
-            <a:ext cx="6264890" cy="973667"/>
+            <a:off x="6148874" y="21187839"/>
+            <a:ext cx="6264890" cy="1217083"/>
           </a:xfrm>
           <a:prstGeom prst="rect">
             <a:avLst/>
@@ -2623,8 +2623,8 @@
         </p:nvSpPr>
         <p:spPr>
           <a:xfrm>
-            <a:off x="13109863" y="16950271"/>
-            <a:ext cx="4176594" cy="973667"/>
+            <a:off x="13109863" y="21187839"/>
+            <a:ext cx="4176594" cy="1217083"/>
           </a:xfrm>
           <a:prstGeom prst="rect">
             <a:avLst/>
@@ -2655,23 +2655,23 @@
     </p:spTree>
     <p:extLst>
       <p:ext uri="{BB962C8B-B14F-4D97-AF65-F5344CB8AC3E}">
-        <p14:creationId xmlns:p14="http://schemas.microsoft.com/office/powerpoint/2010/main" val="3491720137"/>
+        <p14:creationId xmlns:p14="http://schemas.microsoft.com/office/powerpoint/2010/main" val="35636423"/>
       </p:ext>
     </p:extLst>
   </p:cSld>
   <p:clrMap bg1="lt1" tx1="dk1" bg2="lt2" tx2="dk2" accent1="accent1" accent2="accent2" accent3="accent3" accent4="accent4" accent5="accent5" accent6="accent6" hlink="hlink" folHlink="folHlink"/>
   <p:sldLayoutIdLst>
-    <p:sldLayoutId id="2147483661" r:id="rId1"/>
-    <p:sldLayoutId id="2147483662" r:id="rId2"/>
-    <p:sldLayoutId id="2147483663" r:id="rId3"/>
-    <p:sldLayoutId id="2147483664" r:id="rId4"/>
-    <p:sldLayoutId id="2147483665" r:id="rId5"/>
-    <p:sldLayoutId id="2147483666" r:id="rId6"/>
-    <p:sldLayoutId id="2147483667" r:id="rId7"/>
-    <p:sldLayoutId id="2147483668" r:id="rId8"/>
-    <p:sldLayoutId id="2147483669" r:id="rId9"/>
-    <p:sldLayoutId id="2147483670" r:id="rId10"/>
-    <p:sldLayoutId id="2147483671" r:id="rId11"/>
+    <p:sldLayoutId id="2147483673" r:id="rId1"/>
+    <p:sldLayoutId id="2147483674" r:id="rId2"/>
+    <p:sldLayoutId id="2147483675" r:id="rId3"/>
+    <p:sldLayoutId id="2147483676" r:id="rId4"/>
+    <p:sldLayoutId id="2147483677" r:id="rId5"/>
+    <p:sldLayoutId id="2147483678" r:id="rId6"/>
+    <p:sldLayoutId id="2147483679" r:id="rId7"/>
+    <p:sldLayoutId id="2147483680" r:id="rId8"/>
+    <p:sldLayoutId id="2147483681" r:id="rId9"/>
+    <p:sldLayoutId id="2147483682" r:id="rId10"/>
+    <p:sldLayoutId id="2147483683" r:id="rId11"/>
   </p:sldLayoutIdLst>
   <p:txStyles>
     <p:titleStyle>
@@ -2987,7 +2987,7 @@
         </p:nvSpPr>
         <p:spPr>
           <a:xfrm>
-            <a:off x="125667" y="498388"/>
+            <a:off x="125667" y="2784388"/>
             <a:ext cx="2265030" cy="861774"/>
           </a:xfrm>
           <a:prstGeom prst="rect">
@@ -3027,7 +3027,7 @@
         </p:nvSpPr>
         <p:spPr>
           <a:xfrm>
-            <a:off x="125667" y="5778504"/>
+            <a:off x="125668" y="8064504"/>
             <a:ext cx="2307979" cy="861774"/>
           </a:xfrm>
           <a:prstGeom prst="rect">
@@ -3067,7 +3067,7 @@
         </p:nvSpPr>
         <p:spPr>
           <a:xfrm>
-            <a:off x="6510968" y="5778504"/>
+            <a:off x="6510968" y="8064505"/>
             <a:ext cx="2598742" cy="861774"/>
           </a:xfrm>
           <a:prstGeom prst="rect">
@@ -3107,7 +3107,7 @@
         </p:nvSpPr>
         <p:spPr>
           <a:xfrm>
-            <a:off x="12132328" y="5778504"/>
+            <a:off x="12132328" y="8064504"/>
             <a:ext cx="2307788" cy="861774"/>
           </a:xfrm>
           <a:prstGeom prst="rect">
@@ -3162,7 +3162,7 @@
         </p:blipFill>
         <p:spPr bwMode="auto">
           <a:xfrm>
-            <a:off x="460667" y="1501432"/>
+            <a:off x="460667" y="3787433"/>
             <a:ext cx="10401300" cy="4314825"/>
           </a:xfrm>
           <a:prstGeom prst="rect">
@@ -3209,7 +3209,7 @@
         </p:blipFill>
         <p:spPr bwMode="auto">
           <a:xfrm>
-            <a:off x="460667" y="6640278"/>
+            <a:off x="460668" y="8926279"/>
             <a:ext cx="5724525" cy="4295775"/>
           </a:xfrm>
           <a:prstGeom prst="rect">
@@ -3256,7 +3256,7 @@
         </p:blipFill>
         <p:spPr bwMode="auto">
           <a:xfrm>
-            <a:off x="6510968" y="6732365"/>
+            <a:off x="6510968" y="9018367"/>
             <a:ext cx="4876800" cy="4314825"/>
           </a:xfrm>
           <a:prstGeom prst="rect">
@@ -3303,7 +3303,7 @@
         </p:blipFill>
         <p:spPr bwMode="auto">
           <a:xfrm>
-            <a:off x="12132328" y="6640278"/>
+            <a:off x="12132330" y="8926278"/>
             <a:ext cx="5381625" cy="4171950"/>
           </a:xfrm>
           <a:prstGeom prst="rect">
@@ -3365,7 +3365,7 @@
         </p:nvSpPr>
         <p:spPr>
           <a:xfrm>
-            <a:off x="125667" y="243784"/>
+            <a:off x="125668" y="2529784"/>
             <a:ext cx="7863301" cy="1077218"/>
           </a:xfrm>
           <a:prstGeom prst="rect">
@@ -3442,7 +3442,7 @@
         </p:blipFill>
         <p:spPr bwMode="auto">
           <a:xfrm>
-            <a:off x="348874" y="1374968"/>
+            <a:off x="348874" y="3660969"/>
             <a:ext cx="6362700" cy="4295775"/>
           </a:xfrm>
           <a:prstGeom prst="rect">
@@ -3489,7 +3489,7 @@
         </p:blipFill>
         <p:spPr bwMode="auto">
           <a:xfrm>
-            <a:off x="7505065" y="1435100"/>
+            <a:off x="7505065" y="3721102"/>
             <a:ext cx="4876800" cy="4314825"/>
           </a:xfrm>
           <a:prstGeom prst="rect">
@@ -3521,7 +3521,7 @@
         </p:nvSpPr>
         <p:spPr>
           <a:xfrm>
-            <a:off x="125667" y="5873754"/>
+            <a:off x="125668" y="8159755"/>
             <a:ext cx="4420933" cy="769441"/>
           </a:xfrm>
           <a:prstGeom prst="rect">
@@ -3569,7 +3569,7 @@
         </p:nvSpPr>
         <p:spPr>
           <a:xfrm>
-            <a:off x="6560018" y="5873754"/>
+            <a:off x="6560018" y="8159756"/>
             <a:ext cx="4209582" cy="769441"/>
           </a:xfrm>
           <a:prstGeom prst="rect">
@@ -3617,7 +3617,7 @@
         </p:nvSpPr>
         <p:spPr>
           <a:xfrm>
-            <a:off x="12132328" y="5873754"/>
+            <a:off x="12132328" y="8159756"/>
             <a:ext cx="4584408" cy="769441"/>
           </a:xfrm>
           <a:prstGeom prst="rect">
@@ -3680,7 +3680,7 @@
         </p:blipFill>
         <p:spPr bwMode="auto">
           <a:xfrm>
-            <a:off x="460667" y="6735528"/>
+            <a:off x="460668" y="9021529"/>
             <a:ext cx="5724525" cy="4295775"/>
           </a:xfrm>
           <a:prstGeom prst="rect">
@@ -3727,7 +3727,7 @@
         </p:blipFill>
         <p:spPr bwMode="auto">
           <a:xfrm>
-            <a:off x="6510968" y="6827615"/>
+            <a:off x="6510968" y="9113617"/>
             <a:ext cx="4876800" cy="4314825"/>
           </a:xfrm>
           <a:prstGeom prst="rect">
@@ -3774,7 +3774,7 @@
         </p:blipFill>
         <p:spPr bwMode="auto">
           <a:xfrm>
-            <a:off x="12132328" y="6735528"/>
+            <a:off x="12132330" y="9021528"/>
             <a:ext cx="5381625" cy="4171950"/>
           </a:xfrm>
           <a:prstGeom prst="rect">
@@ -3806,7 +3806,7 @@
         </p:nvSpPr>
         <p:spPr>
           <a:xfrm>
-            <a:off x="7547611" y="243870"/>
+            <a:off x="7547611" y="2529871"/>
             <a:ext cx="4288790" cy="1077218"/>
           </a:xfrm>
           <a:prstGeom prst="rect">
@@ -3898,8 +3898,8 @@
         </p:nvSpPr>
         <p:spPr>
           <a:xfrm>
-            <a:off x="325770" y="474795"/>
-            <a:ext cx="2226930" cy="861774"/>
+            <a:off x="423244" y="322395"/>
+            <a:ext cx="5078396" cy="707886"/>
           </a:xfrm>
           <a:prstGeom prst="rect">
             <a:avLst/>
@@ -3913,14 +3913,37 @@
           <a:lstStyle/>
           <a:p>
             <a:r>
-              <a:rPr lang="en-US" sz="5000" b="1" dirty="0"/>
-              <a:t>a</a:t>
-            </a:r>
-            <a:r>
-              <a:rPr lang="en-US" sz="5000" dirty="0"/>
-              <a:t>) YI6</a:t>
-            </a:r>
-            <a:endParaRPr lang="en-US" sz="5000" b="1" dirty="0"/>
+              <a:rPr lang="en-US" sz="4000" b="1" dirty="0">
+                <a:latin typeface="Arial" panose="020B0604020202020204" pitchFamily="34" charset="0"/>
+                <a:cs typeface="Arial" panose="020B0604020202020204" pitchFamily="34" charset="0"/>
+              </a:rPr>
+              <a:t>A</a:t>
+            </a:r>
+            <a:r>
+              <a:rPr lang="en-US" sz="4000" dirty="0">
+                <a:latin typeface="Arial" panose="020B0604020202020204" pitchFamily="34" charset="0"/>
+                <a:cs typeface="Arial" panose="020B0604020202020204" pitchFamily="34" charset="0"/>
+              </a:rPr>
+              <a:t>) </a:t>
+            </a:r>
+            <a:r>
+              <a:rPr lang="en-US" sz="4000" i="1" dirty="0">
+                <a:latin typeface="Arial" panose="020B0604020202020204" pitchFamily="34" charset="0"/>
+                <a:cs typeface="Arial" panose="020B0604020202020204" pitchFamily="34" charset="0"/>
+              </a:rPr>
+              <a:t>E. faecalis </a:t>
+            </a:r>
+            <a:r>
+              <a:rPr lang="en-US" sz="4000" dirty="0">
+                <a:latin typeface="Arial" panose="020B0604020202020204" pitchFamily="34" charset="0"/>
+                <a:cs typeface="Arial" panose="020B0604020202020204" pitchFamily="34" charset="0"/>
+              </a:rPr>
+              <a:t>Yi6-1</a:t>
+            </a:r>
+            <a:endParaRPr lang="en-US" sz="4000" b="1" dirty="0">
+              <a:latin typeface="Arial" panose="020B0604020202020204" pitchFamily="34" charset="0"/>
+              <a:cs typeface="Arial" panose="020B0604020202020204" pitchFamily="34" charset="0"/>
+            </a:endParaRPr>
           </a:p>
         </p:txBody>
       </p:sp>
@@ -3938,8 +3961,8 @@
         </p:nvSpPr>
         <p:spPr>
           <a:xfrm>
-            <a:off x="390122" y="5043404"/>
-            <a:ext cx="2410228" cy="861774"/>
+            <a:off x="295206" y="5364728"/>
+            <a:ext cx="5709354" cy="707886"/>
           </a:xfrm>
           <a:prstGeom prst="rect">
             <a:avLst/>
@@ -3953,14 +3976,37 @@
           <a:lstStyle/>
           <a:p>
             <a:r>
-              <a:rPr lang="en-US" sz="5000" b="1" dirty="0"/>
-              <a:t>b</a:t>
-            </a:r>
-            <a:r>
-              <a:rPr lang="en-US" sz="5000" dirty="0"/>
-              <a:t>) EF06</a:t>
-            </a:r>
-            <a:endParaRPr lang="en-US" sz="5000" b="1" dirty="0"/>
+              <a:rPr lang="en-US" sz="4000" b="1" dirty="0">
+                <a:latin typeface="Arial" panose="020B0604020202020204" pitchFamily="34" charset="0"/>
+                <a:cs typeface="Arial" panose="020B0604020202020204" pitchFamily="34" charset="0"/>
+              </a:rPr>
+              <a:t>B</a:t>
+            </a:r>
+            <a:r>
+              <a:rPr lang="en-US" sz="4000" dirty="0">
+                <a:latin typeface="Arial" panose="020B0604020202020204" pitchFamily="34" charset="0"/>
+                <a:cs typeface="Arial" panose="020B0604020202020204" pitchFamily="34" charset="0"/>
+              </a:rPr>
+              <a:t>) </a:t>
+            </a:r>
+            <a:r>
+              <a:rPr lang="en-US" sz="4000" i="1" dirty="0">
+                <a:latin typeface="Arial" panose="020B0604020202020204" pitchFamily="34" charset="0"/>
+                <a:cs typeface="Arial" panose="020B0604020202020204" pitchFamily="34" charset="0"/>
+              </a:rPr>
+              <a:t>E. faecalis </a:t>
+            </a:r>
+            <a:r>
+              <a:rPr lang="en-US" sz="4000" dirty="0">
+                <a:latin typeface="Arial" panose="020B0604020202020204" pitchFamily="34" charset="0"/>
+                <a:cs typeface="Arial" panose="020B0604020202020204" pitchFamily="34" charset="0"/>
+              </a:rPr>
+              <a:t>EF06</a:t>
+            </a:r>
+            <a:endParaRPr lang="en-US" sz="4000" b="1" dirty="0">
+              <a:latin typeface="Arial" panose="020B0604020202020204" pitchFamily="34" charset="0"/>
+              <a:cs typeface="Arial" panose="020B0604020202020204" pitchFamily="34" charset="0"/>
+            </a:endParaRPr>
           </a:p>
         </p:txBody>
       </p:sp>
@@ -3978,8 +4024,8 @@
         </p:nvSpPr>
         <p:spPr>
           <a:xfrm>
-            <a:off x="390122" y="9506474"/>
-            <a:ext cx="2410228" cy="861774"/>
+            <a:off x="423244" y="10116081"/>
+            <a:ext cx="5078396" cy="707886"/>
           </a:xfrm>
           <a:prstGeom prst="rect">
             <a:avLst/>
@@ -3993,14 +4039,37 @@
           <a:lstStyle/>
           <a:p>
             <a:r>
-              <a:rPr lang="en-US" sz="5000" b="1" dirty="0"/>
-              <a:t>c</a:t>
-            </a:r>
-            <a:r>
-              <a:rPr lang="en-US" sz="5000" dirty="0"/>
-              <a:t>) EF11</a:t>
-            </a:r>
-            <a:endParaRPr lang="en-US" sz="5000" b="1" dirty="0"/>
+              <a:rPr lang="en-US" sz="4000" b="1" dirty="0">
+                <a:latin typeface="Arial" panose="020B0604020202020204" pitchFamily="34" charset="0"/>
+                <a:cs typeface="Arial" panose="020B0604020202020204" pitchFamily="34" charset="0"/>
+              </a:rPr>
+              <a:t>C</a:t>
+            </a:r>
+            <a:r>
+              <a:rPr lang="en-US" sz="4000" dirty="0">
+                <a:latin typeface="Arial" panose="020B0604020202020204" pitchFamily="34" charset="0"/>
+                <a:cs typeface="Arial" panose="020B0604020202020204" pitchFamily="34" charset="0"/>
+              </a:rPr>
+              <a:t>) </a:t>
+            </a:r>
+            <a:r>
+              <a:rPr lang="en-US" sz="4000" i="1" dirty="0">
+                <a:latin typeface="Arial" panose="020B0604020202020204" pitchFamily="34" charset="0"/>
+                <a:cs typeface="Arial" panose="020B0604020202020204" pitchFamily="34" charset="0"/>
+              </a:rPr>
+              <a:t>E. faecalis </a:t>
+            </a:r>
+            <a:r>
+              <a:rPr lang="en-US" sz="4000" dirty="0">
+                <a:latin typeface="Arial" panose="020B0604020202020204" pitchFamily="34" charset="0"/>
+                <a:cs typeface="Arial" panose="020B0604020202020204" pitchFamily="34" charset="0"/>
+              </a:rPr>
+              <a:t>EF11</a:t>
+            </a:r>
+            <a:endParaRPr lang="en-US" sz="4000" b="1" dirty="0">
+              <a:latin typeface="Arial" panose="020B0604020202020204" pitchFamily="34" charset="0"/>
+              <a:cs typeface="Arial" panose="020B0604020202020204" pitchFamily="34" charset="0"/>
+            </a:endParaRPr>
           </a:p>
         </p:txBody>
       </p:sp>
@@ -4033,7 +4102,7 @@
         </p:blipFill>
         <p:spPr bwMode="auto">
           <a:xfrm>
-            <a:off x="615633" y="1226141"/>
+            <a:off x="615634" y="1073741"/>
             <a:ext cx="10563225" cy="4248150"/>
           </a:xfrm>
           <a:prstGeom prst="rect">
@@ -4080,7 +4149,7 @@
         </p:blipFill>
         <p:spPr bwMode="auto">
           <a:xfrm>
-            <a:off x="615633" y="5810903"/>
+            <a:off x="423244" y="6132228"/>
             <a:ext cx="11839575" cy="4295775"/>
           </a:xfrm>
           <a:prstGeom prst="rect">
@@ -4127,7 +4196,7 @@
         </p:blipFill>
         <p:spPr bwMode="auto">
           <a:xfrm>
-            <a:off x="615633" y="10443290"/>
+            <a:off x="429577" y="10870011"/>
             <a:ext cx="10144125" cy="4314825"/>
           </a:xfrm>
           <a:prstGeom prst="rect">
@@ -4145,6 +4214,116 @@
           </a:extLst>
         </p:spPr>
       </p:pic>
+      <p:pic>
+        <p:nvPicPr>
+          <p:cNvPr id="1026" name="Picture 2">
+            <a:extLst>
+              <a:ext uri="{FF2B5EF4-FFF2-40B4-BE49-F238E27FC236}">
+                <a16:creationId xmlns:a16="http://schemas.microsoft.com/office/drawing/2014/main" id="{D9D497AE-E1BE-4762-958D-BA617F7F7073}"/>
+              </a:ext>
+            </a:extLst>
+          </p:cNvPr>
+          <p:cNvPicPr>
+            <a:picLocks noChangeAspect="1" noChangeArrowheads="1"/>
+          </p:cNvPicPr>
+          <p:nvPr/>
+        </p:nvPicPr>
+        <p:blipFill>
+          <a:blip r:embed="rId5">
+            <a:extLst>
+              <a:ext uri="{28A0092B-C50C-407E-A947-70E740481C1C}">
+                <a14:useLocalDpi xmlns:a14="http://schemas.microsoft.com/office/drawing/2010/main" val="0"/>
+              </a:ext>
+            </a:extLst>
+          </a:blip>
+          <a:srcRect/>
+          <a:stretch>
+            <a:fillRect/>
+          </a:stretch>
+        </p:blipFill>
+        <p:spPr bwMode="auto">
+          <a:xfrm>
+            <a:off x="423244" y="15984810"/>
+            <a:ext cx="7229475" cy="4171950"/>
+          </a:xfrm>
+          <a:prstGeom prst="rect">
+            <a:avLst/>
+          </a:prstGeom>
+          <a:noFill/>
+          <a:extLst>
+            <a:ext uri="{909E8E84-426E-40DD-AFC4-6F175D3DCCD1}">
+              <a14:hiddenFill xmlns:a14="http://schemas.microsoft.com/office/drawing/2010/main">
+                <a:solidFill>
+                  <a:srgbClr val="FFFFFF"/>
+                </a:solidFill>
+              </a14:hiddenFill>
+            </a:ext>
+          </a:extLst>
+        </p:spPr>
+      </p:pic>
+      <p:sp>
+        <p:nvSpPr>
+          <p:cNvPr id="2" name="TextBox 1">
+            <a:extLst>
+              <a:ext uri="{FF2B5EF4-FFF2-40B4-BE49-F238E27FC236}">
+                <a16:creationId xmlns:a16="http://schemas.microsoft.com/office/drawing/2014/main" id="{18952644-4033-405D-AF02-3E56C82E47CC}"/>
+              </a:ext>
+            </a:extLst>
+          </p:cNvPr>
+          <p:cNvSpPr txBox="1"/>
+          <p:nvPr/>
+        </p:nvSpPr>
+        <p:spPr>
+          <a:xfrm>
+            <a:off x="423244" y="15230880"/>
+            <a:ext cx="4865036" cy="707886"/>
+          </a:xfrm>
+          <a:prstGeom prst="rect">
+            <a:avLst/>
+          </a:prstGeom>
+          <a:noFill/>
+        </p:spPr>
+        <p:txBody>
+          <a:bodyPr wrap="square" rtlCol="0">
+            <a:spAutoFit/>
+          </a:bodyPr>
+          <a:lstStyle/>
+          <a:p>
+            <a:r>
+              <a:rPr lang="en-US" sz="4000" b="1" dirty="0">
+                <a:latin typeface="Arial" panose="020B0604020202020204" pitchFamily="34" charset="0"/>
+                <a:cs typeface="Arial" panose="020B0604020202020204" pitchFamily="34" charset="0"/>
+              </a:rPr>
+              <a:t>D</a:t>
+            </a:r>
+            <a:r>
+              <a:rPr lang="en-US" sz="4000" dirty="0">
+                <a:latin typeface="Arial" panose="020B0604020202020204" pitchFamily="34" charset="0"/>
+                <a:cs typeface="Arial" panose="020B0604020202020204" pitchFamily="34" charset="0"/>
+              </a:rPr>
+              <a:t>) </a:t>
+            </a:r>
+            <a:r>
+              <a:rPr lang="en-US" sz="4000" i="1" dirty="0">
+                <a:latin typeface="Arial" panose="020B0604020202020204" pitchFamily="34" charset="0"/>
+                <a:cs typeface="Arial" panose="020B0604020202020204" pitchFamily="34" charset="0"/>
+              </a:rPr>
+              <a:t>E. faecalis </a:t>
+            </a:r>
+            <a:r>
+              <a:rPr lang="en-US" sz="4000" dirty="0">
+                <a:latin typeface="Arial" panose="020B0604020202020204" pitchFamily="34" charset="0"/>
+                <a:cs typeface="Arial" panose="020B0604020202020204" pitchFamily="34" charset="0"/>
+              </a:rPr>
+              <a:t>V587</a:t>
+            </a:r>
+            <a:endParaRPr lang="en-US" sz="4000" b="1" dirty="0">
+              <a:latin typeface="Arial" panose="020B0604020202020204" pitchFamily="34" charset="0"/>
+              <a:cs typeface="Arial" panose="020B0604020202020204" pitchFamily="34" charset="0"/>
+            </a:endParaRPr>
+          </a:p>
+        </p:txBody>
+      </p:sp>
     </p:spTree>
     <p:extLst>
       <p:ext uri="{BB962C8B-B14F-4D97-AF65-F5344CB8AC3E}">

</xml_diff>

<commit_message>
vertical boxplots. timecource minus tp0
</commit_message>
<xml_diff>
--- a/figures/Figures.pptx
+++ b/figures/Figures.pptx
@@ -7,7 +7,8 @@
   <p:sldIdLst>
     <p:sldId id="256" r:id="rId2"/>
     <p:sldId id="258" r:id="rId3"/>
-    <p:sldId id="257" r:id="rId4"/>
+    <p:sldId id="259" r:id="rId4"/>
+    <p:sldId id="257" r:id="rId5"/>
   </p:sldIdLst>
   <p:sldSz cx="18562638" cy="22860000"/>
   <p:notesSz cx="6858000" cy="9144000"/>
@@ -245,7 +246,7 @@
           <a:p>
             <a:fld id="{AAEC4A40-A4AF-4D07-B5DE-5231CAC44A4C}" type="datetimeFigureOut">
               <a:rPr lang="en-US" smtClean="0"/>
-              <a:t>11/9/2020</a:t>
+              <a:t>11/18/2020</a:t>
             </a:fld>
             <a:endParaRPr lang="en-US"/>
           </a:p>
@@ -415,7 +416,7 @@
           <a:p>
             <a:fld id="{AAEC4A40-A4AF-4D07-B5DE-5231CAC44A4C}" type="datetimeFigureOut">
               <a:rPr lang="en-US" smtClean="0"/>
-              <a:t>11/9/2020</a:t>
+              <a:t>11/18/2020</a:t>
             </a:fld>
             <a:endParaRPr lang="en-US"/>
           </a:p>
@@ -595,7 +596,7 @@
           <a:p>
             <a:fld id="{AAEC4A40-A4AF-4D07-B5DE-5231CAC44A4C}" type="datetimeFigureOut">
               <a:rPr lang="en-US" smtClean="0"/>
-              <a:t>11/9/2020</a:t>
+              <a:t>11/18/2020</a:t>
             </a:fld>
             <a:endParaRPr lang="en-US"/>
           </a:p>
@@ -765,7 +766,7 @@
           <a:p>
             <a:fld id="{AAEC4A40-A4AF-4D07-B5DE-5231CAC44A4C}" type="datetimeFigureOut">
               <a:rPr lang="en-US" smtClean="0"/>
-              <a:t>11/9/2020</a:t>
+              <a:t>11/18/2020</a:t>
             </a:fld>
             <a:endParaRPr lang="en-US"/>
           </a:p>
@@ -1009,7 +1010,7 @@
           <a:p>
             <a:fld id="{AAEC4A40-A4AF-4D07-B5DE-5231CAC44A4C}" type="datetimeFigureOut">
               <a:rPr lang="en-US" smtClean="0"/>
-              <a:t>11/9/2020</a:t>
+              <a:t>11/18/2020</a:t>
             </a:fld>
             <a:endParaRPr lang="en-US"/>
           </a:p>
@@ -1241,7 +1242,7 @@
           <a:p>
             <a:fld id="{AAEC4A40-A4AF-4D07-B5DE-5231CAC44A4C}" type="datetimeFigureOut">
               <a:rPr lang="en-US" smtClean="0"/>
-              <a:t>11/9/2020</a:t>
+              <a:t>11/18/2020</a:t>
             </a:fld>
             <a:endParaRPr lang="en-US"/>
           </a:p>
@@ -1608,7 +1609,7 @@
           <a:p>
             <a:fld id="{AAEC4A40-A4AF-4D07-B5DE-5231CAC44A4C}" type="datetimeFigureOut">
               <a:rPr lang="en-US" smtClean="0"/>
-              <a:t>11/9/2020</a:t>
+              <a:t>11/18/2020</a:t>
             </a:fld>
             <a:endParaRPr lang="en-US"/>
           </a:p>
@@ -1726,7 +1727,7 @@
           <a:p>
             <a:fld id="{AAEC4A40-A4AF-4D07-B5DE-5231CAC44A4C}" type="datetimeFigureOut">
               <a:rPr lang="en-US" smtClean="0"/>
-              <a:t>11/9/2020</a:t>
+              <a:t>11/18/2020</a:t>
             </a:fld>
             <a:endParaRPr lang="en-US"/>
           </a:p>
@@ -1821,7 +1822,7 @@
           <a:p>
             <a:fld id="{AAEC4A40-A4AF-4D07-B5DE-5231CAC44A4C}" type="datetimeFigureOut">
               <a:rPr lang="en-US" smtClean="0"/>
-              <a:t>11/9/2020</a:t>
+              <a:t>11/18/2020</a:t>
             </a:fld>
             <a:endParaRPr lang="en-US"/>
           </a:p>
@@ -2098,7 +2099,7 @@
           <a:p>
             <a:fld id="{AAEC4A40-A4AF-4D07-B5DE-5231CAC44A4C}" type="datetimeFigureOut">
               <a:rPr lang="en-US" smtClean="0"/>
-              <a:t>11/9/2020</a:t>
+              <a:t>11/18/2020</a:t>
             </a:fld>
             <a:endParaRPr lang="en-US"/>
           </a:p>
@@ -2355,7 +2356,7 @@
           <a:p>
             <a:fld id="{AAEC4A40-A4AF-4D07-B5DE-5231CAC44A4C}" type="datetimeFigureOut">
               <a:rPr lang="en-US" smtClean="0"/>
-              <a:t>11/9/2020</a:t>
+              <a:t>11/18/2020</a:t>
             </a:fld>
             <a:endParaRPr lang="en-US"/>
           </a:p>
@@ -2568,7 +2569,7 @@
           <a:p>
             <a:fld id="{AAEC4A40-A4AF-4D07-B5DE-5231CAC44A4C}" type="datetimeFigureOut">
               <a:rPr lang="en-US" smtClean="0"/>
-              <a:t>11/9/2020</a:t>
+              <a:t>11/18/2020</a:t>
             </a:fld>
             <a:endParaRPr lang="en-US"/>
           </a:p>
@@ -3353,6 +3354,58 @@
       </p:grpSpPr>
       <p:sp>
         <p:nvSpPr>
+          <p:cNvPr id="2" name="Rectangle 1">
+            <a:extLst>
+              <a:ext uri="{FF2B5EF4-FFF2-40B4-BE49-F238E27FC236}">
+                <a16:creationId xmlns:a16="http://schemas.microsoft.com/office/drawing/2014/main" id="{8DA4DBB0-0245-4960-BCB2-E112BF87B22C}"/>
+              </a:ext>
+            </a:extLst>
+          </p:cNvPr>
+          <p:cNvSpPr/>
+          <p:nvPr/>
+        </p:nvSpPr>
+        <p:spPr>
+          <a:xfrm>
+            <a:off x="125668" y="2529784"/>
+            <a:ext cx="17976302" cy="11303447"/>
+          </a:xfrm>
+          <a:prstGeom prst="rect">
+            <a:avLst/>
+          </a:prstGeom>
+          <a:solidFill>
+            <a:schemeClr val="bg1"/>
+          </a:solidFill>
+          <a:ln>
+            <a:noFill/>
+          </a:ln>
+        </p:spPr>
+        <p:style>
+          <a:lnRef idx="2">
+            <a:schemeClr val="accent1">
+              <a:shade val="50000"/>
+            </a:schemeClr>
+          </a:lnRef>
+          <a:fillRef idx="1">
+            <a:schemeClr val="accent1"/>
+          </a:fillRef>
+          <a:effectRef idx="0">
+            <a:schemeClr val="accent1"/>
+          </a:effectRef>
+          <a:fontRef idx="minor">
+            <a:schemeClr val="lt1"/>
+          </a:fontRef>
+        </p:style>
+        <p:txBody>
+          <a:bodyPr rtlCol="0" anchor="ctr"/>
+          <a:lstStyle/>
+          <a:p>
+            <a:pPr algn="ctr"/>
+            <a:endParaRPr lang="en-US"/>
+          </a:p>
+        </p:txBody>
+      </p:sp>
+      <p:sp>
+        <p:nvSpPr>
           <p:cNvPr id="5" name="TextBox 4">
             <a:extLst>
               <a:ext uri="{FF2B5EF4-FFF2-40B4-BE49-F238E27FC236}">
@@ -3366,7 +3419,7 @@
         <p:spPr>
           <a:xfrm>
             <a:off x="125668" y="2529784"/>
-            <a:ext cx="7863301" cy="1077218"/>
+            <a:ext cx="7863301" cy="1015663"/>
           </a:xfrm>
           <a:prstGeom prst="rect">
             <a:avLst/>
@@ -3380,36 +3433,60 @@
           <a:lstStyle/>
           <a:p>
             <a:r>
-              <a:rPr lang="en-US" sz="4400" b="1" dirty="0"/>
-              <a:t>a</a:t>
-            </a:r>
-            <a:r>
-              <a:rPr lang="en-US" sz="4400" dirty="0"/>
+              <a:rPr lang="en-US" sz="4000" b="1" dirty="0">
+                <a:latin typeface="Arial" panose="020B0604020202020204" pitchFamily="34" charset="0"/>
+                <a:cs typeface="Arial" panose="020B0604020202020204" pitchFamily="34" charset="0"/>
+              </a:rPr>
+              <a:t>A</a:t>
+            </a:r>
+            <a:r>
+              <a:rPr lang="en-US" sz="4000" dirty="0">
+                <a:latin typeface="Arial" panose="020B0604020202020204" pitchFamily="34" charset="0"/>
+                <a:cs typeface="Arial" panose="020B0604020202020204" pitchFamily="34" charset="0"/>
+              </a:rPr>
               <a:t>) </a:t>
             </a:r>
             <a:r>
-              <a:rPr lang="en-US" sz="4400" i="1" dirty="0"/>
+              <a:rPr lang="en-US" sz="4000" i="1" dirty="0">
+                <a:latin typeface="Arial" panose="020B0604020202020204" pitchFamily="34" charset="0"/>
+                <a:cs typeface="Arial" panose="020B0604020202020204" pitchFamily="34" charset="0"/>
+              </a:rPr>
               <a:t>E. faecalis </a:t>
             </a:r>
             <a:r>
-              <a:rPr lang="en-US" sz="4400" dirty="0"/>
-              <a:t>YI6</a:t>
-            </a:r>
-          </a:p>
-          <a:p>
-            <a:r>
-              <a:rPr lang="en-US" sz="2000" dirty="0"/>
+              <a:rPr lang="en-US" sz="4000" dirty="0">
+                <a:latin typeface="Arial" panose="020B0604020202020204" pitchFamily="34" charset="0"/>
+                <a:cs typeface="Arial" panose="020B0604020202020204" pitchFamily="34" charset="0"/>
+              </a:rPr>
+              <a:t>Yi6-1</a:t>
+            </a:r>
+          </a:p>
+          <a:p>
+            <a:r>
+              <a:rPr lang="en-US" sz="2000" dirty="0">
+                <a:latin typeface="Arial" panose="020B0604020202020204" pitchFamily="34" charset="0"/>
+                <a:cs typeface="Arial" panose="020B0604020202020204" pitchFamily="34" charset="0"/>
+              </a:rPr>
               <a:t>	Individual phages </a:t>
             </a:r>
             <a:r>
-              <a:rPr lang="en-US" sz="2000" b="1" dirty="0"/>
+              <a:rPr lang="en-US" sz="2000" b="1" dirty="0">
+                <a:latin typeface="Arial" panose="020B0604020202020204" pitchFamily="34" charset="0"/>
+                <a:cs typeface="Arial" panose="020B0604020202020204" pitchFamily="34" charset="0"/>
+              </a:rPr>
               <a:t>don’t</a:t>
             </a:r>
             <a:r>
-              <a:rPr lang="en-US" sz="2000" dirty="0"/>
+              <a:rPr lang="en-US" sz="2000" dirty="0">
+                <a:latin typeface="Arial" panose="020B0604020202020204" pitchFamily="34" charset="0"/>
+                <a:cs typeface="Arial" panose="020B0604020202020204" pitchFamily="34" charset="0"/>
+              </a:rPr>
               <a:t> clear host</a:t>
             </a:r>
-            <a:endParaRPr lang="en-US" sz="2000" b="1" dirty="0"/>
+            <a:endParaRPr lang="en-US" sz="2000" b="1" dirty="0">
+              <a:latin typeface="Arial" panose="020B0604020202020204" pitchFamily="34" charset="0"/>
+              <a:cs typeface="Arial" panose="020B0604020202020204" pitchFamily="34" charset="0"/>
+            </a:endParaRPr>
           </a:p>
         </p:txBody>
       </p:sp>
@@ -3521,8 +3598,8 @@
         </p:nvSpPr>
         <p:spPr>
           <a:xfrm>
-            <a:off x="125668" y="8159755"/>
-            <a:ext cx="4420933" cy="769441"/>
+            <a:off x="125668" y="8296915"/>
+            <a:ext cx="5022570" cy="707886"/>
           </a:xfrm>
           <a:prstGeom prst="rect">
             <a:avLst/>
@@ -3536,22 +3613,37 @@
           <a:lstStyle/>
           <a:p>
             <a:r>
-              <a:rPr lang="en-US" sz="4400" b="1" dirty="0"/>
-              <a:t>c</a:t>
-            </a:r>
-            <a:r>
-              <a:rPr lang="en-US" sz="4400" dirty="0"/>
+              <a:rPr lang="en-US" sz="4000" b="1" dirty="0">
+                <a:latin typeface="Arial" panose="020B0604020202020204" pitchFamily="34" charset="0"/>
+                <a:cs typeface="Arial" panose="020B0604020202020204" pitchFamily="34" charset="0"/>
+              </a:rPr>
+              <a:t>C</a:t>
+            </a:r>
+            <a:r>
+              <a:rPr lang="en-US" sz="4000" dirty="0">
+                <a:latin typeface="Arial" panose="020B0604020202020204" pitchFamily="34" charset="0"/>
+                <a:cs typeface="Arial" panose="020B0604020202020204" pitchFamily="34" charset="0"/>
+              </a:rPr>
               <a:t>) </a:t>
             </a:r>
             <a:r>
-              <a:rPr lang="en-US" sz="4400" i="1" dirty="0"/>
+              <a:rPr lang="en-US" sz="4000" i="1" dirty="0">
+                <a:latin typeface="Arial" panose="020B0604020202020204" pitchFamily="34" charset="0"/>
+                <a:cs typeface="Arial" panose="020B0604020202020204" pitchFamily="34" charset="0"/>
+              </a:rPr>
               <a:t>E. faecalis </a:t>
             </a:r>
             <a:r>
-              <a:rPr lang="en-US" sz="4400" dirty="0"/>
+              <a:rPr lang="en-US" sz="4000" dirty="0">
+                <a:latin typeface="Arial" panose="020B0604020202020204" pitchFamily="34" charset="0"/>
+                <a:cs typeface="Arial" panose="020B0604020202020204" pitchFamily="34" charset="0"/>
+              </a:rPr>
               <a:t>EF06</a:t>
             </a:r>
-            <a:endParaRPr lang="en-US" sz="4400" b="1" dirty="0"/>
+            <a:endParaRPr lang="en-US" sz="4000" b="1" dirty="0">
+              <a:latin typeface="Arial" panose="020B0604020202020204" pitchFamily="34" charset="0"/>
+              <a:cs typeface="Arial" panose="020B0604020202020204" pitchFamily="34" charset="0"/>
+            </a:endParaRPr>
           </a:p>
         </p:txBody>
       </p:sp>
@@ -3569,8 +3661,8 @@
         </p:nvSpPr>
         <p:spPr>
           <a:xfrm>
-            <a:off x="6560018" y="8159756"/>
-            <a:ext cx="4209582" cy="769441"/>
+            <a:off x="6560017" y="8296916"/>
+            <a:ext cx="4584407" cy="707886"/>
           </a:xfrm>
           <a:prstGeom prst="rect">
             <a:avLst/>
@@ -3584,22 +3676,30 @@
           <a:lstStyle/>
           <a:p>
             <a:r>
-              <a:rPr lang="en-US" sz="4400" b="1" dirty="0"/>
-              <a:t>d</a:t>
-            </a:r>
-            <a:r>
-              <a:rPr lang="en-US" sz="4400" dirty="0"/>
-              <a:t>) </a:t>
-            </a:r>
-            <a:r>
-              <a:rPr lang="en-US" sz="4400" i="1" dirty="0"/>
+              <a:rPr lang="en-US" sz="4000" dirty="0">
+                <a:latin typeface="Arial" panose="020B0604020202020204" pitchFamily="34" charset="0"/>
+                <a:cs typeface="Arial" panose="020B0604020202020204" pitchFamily="34" charset="0"/>
+              </a:rPr>
+              <a:t>D) </a:t>
+            </a:r>
+            <a:r>
+              <a:rPr lang="en-US" sz="4000" i="1" dirty="0">
+                <a:latin typeface="Arial" panose="020B0604020202020204" pitchFamily="34" charset="0"/>
+                <a:cs typeface="Arial" panose="020B0604020202020204" pitchFamily="34" charset="0"/>
+              </a:rPr>
               <a:t>E. faecalis </a:t>
             </a:r>
             <a:r>
-              <a:rPr lang="en-US" sz="4400" dirty="0"/>
+              <a:rPr lang="en-US" sz="4000" dirty="0">
+                <a:latin typeface="Arial" panose="020B0604020202020204" pitchFamily="34" charset="0"/>
+                <a:cs typeface="Arial" panose="020B0604020202020204" pitchFamily="34" charset="0"/>
+              </a:rPr>
               <a:t>Ef11</a:t>
             </a:r>
-            <a:endParaRPr lang="en-US" sz="4400" b="1" dirty="0"/>
+            <a:endParaRPr lang="en-US" sz="4000" b="1" dirty="0">
+              <a:latin typeface="Arial" panose="020B0604020202020204" pitchFamily="34" charset="0"/>
+              <a:cs typeface="Arial" panose="020B0604020202020204" pitchFamily="34" charset="0"/>
+            </a:endParaRPr>
           </a:p>
         </p:txBody>
       </p:sp>
@@ -3617,8 +3717,8 @@
         </p:nvSpPr>
         <p:spPr>
           <a:xfrm>
-            <a:off x="12132328" y="8159756"/>
-            <a:ext cx="4584408" cy="769441"/>
+            <a:off x="12132328" y="8296916"/>
+            <a:ext cx="4584408" cy="707886"/>
           </a:xfrm>
           <a:prstGeom prst="rect">
             <a:avLst/>
@@ -3632,22 +3732,37 @@
           <a:lstStyle/>
           <a:p>
             <a:r>
-              <a:rPr lang="en-US" sz="4400" b="1" dirty="0"/>
-              <a:t>e</a:t>
-            </a:r>
-            <a:r>
-              <a:rPr lang="en-US" sz="4400" dirty="0"/>
+              <a:rPr lang="en-US" sz="4000" b="1" dirty="0">
+                <a:latin typeface="Arial" panose="020B0604020202020204" pitchFamily="34" charset="0"/>
+                <a:cs typeface="Arial" panose="020B0604020202020204" pitchFamily="34" charset="0"/>
+              </a:rPr>
+              <a:t>E</a:t>
+            </a:r>
+            <a:r>
+              <a:rPr lang="en-US" sz="4000" dirty="0">
+                <a:latin typeface="Arial" panose="020B0604020202020204" pitchFamily="34" charset="0"/>
+                <a:cs typeface="Arial" panose="020B0604020202020204" pitchFamily="34" charset="0"/>
+              </a:rPr>
               <a:t>) </a:t>
             </a:r>
             <a:r>
-              <a:rPr lang="en-US" sz="4400" i="1" dirty="0"/>
+              <a:rPr lang="en-US" sz="4000" i="1" dirty="0">
+                <a:latin typeface="Arial" panose="020B0604020202020204" pitchFamily="34" charset="0"/>
+                <a:cs typeface="Arial" panose="020B0604020202020204" pitchFamily="34" charset="0"/>
+              </a:rPr>
               <a:t>E. faecalis </a:t>
             </a:r>
             <a:r>
-              <a:rPr lang="en-US" sz="4400" dirty="0"/>
+              <a:rPr lang="en-US" sz="4000" dirty="0">
+                <a:latin typeface="Arial" panose="020B0604020202020204" pitchFamily="34" charset="0"/>
+                <a:cs typeface="Arial" panose="020B0604020202020204" pitchFamily="34" charset="0"/>
+              </a:rPr>
               <a:t>V587</a:t>
             </a:r>
-            <a:endParaRPr lang="en-US" sz="4400" b="1" dirty="0"/>
+            <a:endParaRPr lang="en-US" sz="4000" b="1" dirty="0">
+              <a:latin typeface="Arial" panose="020B0604020202020204" pitchFamily="34" charset="0"/>
+              <a:cs typeface="Arial" panose="020B0604020202020204" pitchFamily="34" charset="0"/>
+            </a:endParaRPr>
           </a:p>
         </p:txBody>
       </p:sp>
@@ -3806,8 +3921,8 @@
         </p:nvSpPr>
         <p:spPr>
           <a:xfrm>
-            <a:off x="7547611" y="2529871"/>
-            <a:ext cx="4288790" cy="1077218"/>
+            <a:off x="7547610" y="2529871"/>
+            <a:ext cx="5314949" cy="1015663"/>
           </a:xfrm>
           <a:prstGeom prst="rect">
             <a:avLst/>
@@ -3821,36 +3936,60 @@
           <a:lstStyle/>
           <a:p>
             <a:r>
-              <a:rPr lang="en-US" sz="4400" b="1" dirty="0"/>
-              <a:t>b</a:t>
-            </a:r>
-            <a:r>
-              <a:rPr lang="en-US" sz="4400" dirty="0"/>
+              <a:rPr lang="en-US" sz="4000" b="1" dirty="0">
+                <a:latin typeface="Arial" panose="020B0604020202020204" pitchFamily="34" charset="0"/>
+                <a:cs typeface="Arial" panose="020B0604020202020204" pitchFamily="34" charset="0"/>
+              </a:rPr>
+              <a:t>B</a:t>
+            </a:r>
+            <a:r>
+              <a:rPr lang="en-US" sz="4000" dirty="0">
+                <a:latin typeface="Arial" panose="020B0604020202020204" pitchFamily="34" charset="0"/>
+                <a:cs typeface="Arial" panose="020B0604020202020204" pitchFamily="34" charset="0"/>
+              </a:rPr>
               <a:t>) </a:t>
             </a:r>
             <a:r>
-              <a:rPr lang="en-US" sz="4400" i="1" dirty="0"/>
+              <a:rPr lang="en-US" sz="4000" i="1" dirty="0">
+                <a:latin typeface="Arial" panose="020B0604020202020204" pitchFamily="34" charset="0"/>
+                <a:cs typeface="Arial" panose="020B0604020202020204" pitchFamily="34" charset="0"/>
+              </a:rPr>
               <a:t>E. faecalis </a:t>
             </a:r>
             <a:r>
-              <a:rPr lang="en-US" sz="4400" dirty="0"/>
-              <a:t>YI6</a:t>
-            </a:r>
-          </a:p>
-          <a:p>
-            <a:r>
-              <a:rPr lang="en-US" sz="2000" dirty="0"/>
+              <a:rPr lang="en-US" sz="4000" dirty="0">
+                <a:latin typeface="Arial" panose="020B0604020202020204" pitchFamily="34" charset="0"/>
+                <a:cs typeface="Arial" panose="020B0604020202020204" pitchFamily="34" charset="0"/>
+              </a:rPr>
+              <a:t>Yi6-1</a:t>
+            </a:r>
+          </a:p>
+          <a:p>
+            <a:r>
+              <a:rPr lang="en-US" sz="2000" dirty="0">
+                <a:latin typeface="Arial" panose="020B0604020202020204" pitchFamily="34" charset="0"/>
+                <a:cs typeface="Arial" panose="020B0604020202020204" pitchFamily="34" charset="0"/>
+              </a:rPr>
               <a:t>	Individual phages </a:t>
             </a:r>
             <a:r>
-              <a:rPr lang="en-US" sz="2000" b="1" dirty="0"/>
+              <a:rPr lang="en-US" sz="2000" b="1" dirty="0">
+                <a:latin typeface="Arial" panose="020B0604020202020204" pitchFamily="34" charset="0"/>
+                <a:cs typeface="Arial" panose="020B0604020202020204" pitchFamily="34" charset="0"/>
+              </a:rPr>
               <a:t>do</a:t>
             </a:r>
             <a:r>
-              <a:rPr lang="en-US" sz="2000" dirty="0"/>
+              <a:rPr lang="en-US" sz="2000" dirty="0">
+                <a:latin typeface="Arial" panose="020B0604020202020204" pitchFamily="34" charset="0"/>
+                <a:cs typeface="Arial" panose="020B0604020202020204" pitchFamily="34" charset="0"/>
+              </a:rPr>
               <a:t> clear host</a:t>
             </a:r>
-            <a:endParaRPr lang="en-US" sz="2000" b="1" dirty="0"/>
+            <a:endParaRPr lang="en-US" sz="2000" b="1" dirty="0">
+              <a:latin typeface="Arial" panose="020B0604020202020204" pitchFamily="34" charset="0"/>
+              <a:cs typeface="Arial" panose="020B0604020202020204" pitchFamily="34" charset="0"/>
+            </a:endParaRPr>
           </a:p>
         </p:txBody>
       </p:sp>
@@ -3886,199 +4025,62 @@
       </p:grpSpPr>
       <p:sp>
         <p:nvSpPr>
-          <p:cNvPr id="4" name="TextBox 3">
+          <p:cNvPr id="10" name="Rectangle 9">
             <a:extLst>
               <a:ext uri="{FF2B5EF4-FFF2-40B4-BE49-F238E27FC236}">
-                <a16:creationId xmlns:a16="http://schemas.microsoft.com/office/drawing/2014/main" id="{1A0A423D-5221-41EC-982A-095F6F1B0BCA}"/>
+                <a16:creationId xmlns:a16="http://schemas.microsoft.com/office/drawing/2014/main" id="{FAA3F314-F421-44D5-BD1E-86E0FF7BDBE3}"/>
               </a:ext>
             </a:extLst>
           </p:cNvPr>
-          <p:cNvSpPr txBox="1"/>
+          <p:cNvSpPr/>
           <p:nvPr/>
         </p:nvSpPr>
         <p:spPr>
           <a:xfrm>
-            <a:off x="423244" y="322395"/>
-            <a:ext cx="5078396" cy="707886"/>
+            <a:off x="686095" y="247313"/>
+            <a:ext cx="15684616" cy="16506855"/>
           </a:xfrm>
           <a:prstGeom prst="rect">
             <a:avLst/>
           </a:prstGeom>
-          <a:noFill/>
-        </p:spPr>
-        <p:txBody>
-          <a:bodyPr wrap="square" rtlCol="0">
-            <a:spAutoFit/>
-          </a:bodyPr>
-          <a:lstStyle/>
-          <a:p>
-            <a:r>
-              <a:rPr lang="en-US" sz="4000" b="1" dirty="0">
-                <a:latin typeface="Arial" panose="020B0604020202020204" pitchFamily="34" charset="0"/>
-                <a:cs typeface="Arial" panose="020B0604020202020204" pitchFamily="34" charset="0"/>
-              </a:rPr>
-              <a:t>A</a:t>
-            </a:r>
-            <a:r>
-              <a:rPr lang="en-US" sz="4000" dirty="0">
-                <a:latin typeface="Arial" panose="020B0604020202020204" pitchFamily="34" charset="0"/>
-                <a:cs typeface="Arial" panose="020B0604020202020204" pitchFamily="34" charset="0"/>
-              </a:rPr>
-              <a:t>) </a:t>
-            </a:r>
-            <a:r>
-              <a:rPr lang="en-US" sz="4000" i="1" dirty="0">
-                <a:latin typeface="Arial" panose="020B0604020202020204" pitchFamily="34" charset="0"/>
-                <a:cs typeface="Arial" panose="020B0604020202020204" pitchFamily="34" charset="0"/>
-              </a:rPr>
-              <a:t>E. faecalis </a:t>
-            </a:r>
-            <a:r>
-              <a:rPr lang="en-US" sz="4000" dirty="0">
-                <a:latin typeface="Arial" panose="020B0604020202020204" pitchFamily="34" charset="0"/>
-                <a:cs typeface="Arial" panose="020B0604020202020204" pitchFamily="34" charset="0"/>
-              </a:rPr>
-              <a:t>Yi6-1</a:t>
-            </a:r>
-            <a:endParaRPr lang="en-US" sz="4000" b="1" dirty="0">
-              <a:latin typeface="Arial" panose="020B0604020202020204" pitchFamily="34" charset="0"/>
-              <a:cs typeface="Arial" panose="020B0604020202020204" pitchFamily="34" charset="0"/>
-            </a:endParaRPr>
-          </a:p>
-        </p:txBody>
-      </p:sp>
-      <p:sp>
-        <p:nvSpPr>
-          <p:cNvPr id="5" name="TextBox 4">
-            <a:extLst>
-              <a:ext uri="{FF2B5EF4-FFF2-40B4-BE49-F238E27FC236}">
-                <a16:creationId xmlns:a16="http://schemas.microsoft.com/office/drawing/2014/main" id="{11306143-D5BF-4A46-91BC-5133E33DBB2F}"/>
-              </a:ext>
-            </a:extLst>
-          </p:cNvPr>
-          <p:cNvSpPr txBox="1"/>
-          <p:nvPr/>
-        </p:nvSpPr>
-        <p:spPr>
-          <a:xfrm>
-            <a:off x="295206" y="5364728"/>
-            <a:ext cx="5709354" cy="707886"/>
-          </a:xfrm>
-          <a:prstGeom prst="rect">
-            <a:avLst/>
-          </a:prstGeom>
-          <a:noFill/>
-        </p:spPr>
-        <p:txBody>
-          <a:bodyPr wrap="square" rtlCol="0">
-            <a:spAutoFit/>
-          </a:bodyPr>
-          <a:lstStyle/>
-          <a:p>
-            <a:r>
-              <a:rPr lang="en-US" sz="4000" b="1" dirty="0">
-                <a:latin typeface="Arial" panose="020B0604020202020204" pitchFamily="34" charset="0"/>
-                <a:cs typeface="Arial" panose="020B0604020202020204" pitchFamily="34" charset="0"/>
-              </a:rPr>
-              <a:t>B</a:t>
-            </a:r>
-            <a:r>
-              <a:rPr lang="en-US" sz="4000" dirty="0">
-                <a:latin typeface="Arial" panose="020B0604020202020204" pitchFamily="34" charset="0"/>
-                <a:cs typeface="Arial" panose="020B0604020202020204" pitchFamily="34" charset="0"/>
-              </a:rPr>
-              <a:t>) </a:t>
-            </a:r>
-            <a:r>
-              <a:rPr lang="en-US" sz="4000" i="1" dirty="0">
-                <a:latin typeface="Arial" panose="020B0604020202020204" pitchFamily="34" charset="0"/>
-                <a:cs typeface="Arial" panose="020B0604020202020204" pitchFamily="34" charset="0"/>
-              </a:rPr>
-              <a:t>E. faecalis </a:t>
-            </a:r>
-            <a:r>
-              <a:rPr lang="en-US" sz="4000" dirty="0">
-                <a:latin typeface="Arial" panose="020B0604020202020204" pitchFamily="34" charset="0"/>
-                <a:cs typeface="Arial" panose="020B0604020202020204" pitchFamily="34" charset="0"/>
-              </a:rPr>
-              <a:t>EF06</a:t>
-            </a:r>
-            <a:endParaRPr lang="en-US" sz="4000" b="1" dirty="0">
-              <a:latin typeface="Arial" panose="020B0604020202020204" pitchFamily="34" charset="0"/>
-              <a:cs typeface="Arial" panose="020B0604020202020204" pitchFamily="34" charset="0"/>
-            </a:endParaRPr>
-          </a:p>
-        </p:txBody>
-      </p:sp>
-      <p:sp>
-        <p:nvSpPr>
-          <p:cNvPr id="6" name="TextBox 5">
-            <a:extLst>
-              <a:ext uri="{FF2B5EF4-FFF2-40B4-BE49-F238E27FC236}">
-                <a16:creationId xmlns:a16="http://schemas.microsoft.com/office/drawing/2014/main" id="{27604841-55A7-45C6-A64B-03FA0F2446B6}"/>
-              </a:ext>
-            </a:extLst>
-          </p:cNvPr>
-          <p:cNvSpPr txBox="1"/>
-          <p:nvPr/>
-        </p:nvSpPr>
-        <p:spPr>
-          <a:xfrm>
-            <a:off x="423244" y="10116081"/>
-            <a:ext cx="5078396" cy="707886"/>
-          </a:xfrm>
-          <a:prstGeom prst="rect">
-            <a:avLst/>
-          </a:prstGeom>
-          <a:noFill/>
-        </p:spPr>
-        <p:txBody>
-          <a:bodyPr wrap="square" rtlCol="0">
-            <a:spAutoFit/>
-          </a:bodyPr>
-          <a:lstStyle/>
-          <a:p>
-            <a:r>
-              <a:rPr lang="en-US" sz="4000" b="1" dirty="0">
-                <a:latin typeface="Arial" panose="020B0604020202020204" pitchFamily="34" charset="0"/>
-                <a:cs typeface="Arial" panose="020B0604020202020204" pitchFamily="34" charset="0"/>
-              </a:rPr>
-              <a:t>C</a:t>
-            </a:r>
-            <a:r>
-              <a:rPr lang="en-US" sz="4000" dirty="0">
-                <a:latin typeface="Arial" panose="020B0604020202020204" pitchFamily="34" charset="0"/>
-                <a:cs typeface="Arial" panose="020B0604020202020204" pitchFamily="34" charset="0"/>
-              </a:rPr>
-              <a:t>) </a:t>
-            </a:r>
-            <a:r>
-              <a:rPr lang="en-US" sz="4000" i="1" dirty="0">
-                <a:latin typeface="Arial" panose="020B0604020202020204" pitchFamily="34" charset="0"/>
-                <a:cs typeface="Arial" panose="020B0604020202020204" pitchFamily="34" charset="0"/>
-              </a:rPr>
-              <a:t>E. faecalis </a:t>
-            </a:r>
-            <a:r>
-              <a:rPr lang="en-US" sz="4000" dirty="0">
-                <a:latin typeface="Arial" panose="020B0604020202020204" pitchFamily="34" charset="0"/>
-                <a:cs typeface="Arial" panose="020B0604020202020204" pitchFamily="34" charset="0"/>
-              </a:rPr>
-              <a:t>EF11</a:t>
-            </a:r>
-            <a:endParaRPr lang="en-US" sz="4000" b="1" dirty="0">
-              <a:latin typeface="Arial" panose="020B0604020202020204" pitchFamily="34" charset="0"/>
-              <a:cs typeface="Arial" panose="020B0604020202020204" pitchFamily="34" charset="0"/>
-            </a:endParaRPr>
+          <a:solidFill>
+            <a:schemeClr val="bg1"/>
+          </a:solidFill>
+          <a:ln>
+            <a:noFill/>
+          </a:ln>
+        </p:spPr>
+        <p:style>
+          <a:lnRef idx="2">
+            <a:schemeClr val="accent1">
+              <a:shade val="50000"/>
+            </a:schemeClr>
+          </a:lnRef>
+          <a:fillRef idx="1">
+            <a:schemeClr val="accent1"/>
+          </a:fillRef>
+          <a:effectRef idx="0">
+            <a:schemeClr val="accent1"/>
+          </a:effectRef>
+          <a:fontRef idx="minor">
+            <a:schemeClr val="lt1"/>
+          </a:fontRef>
+        </p:style>
+        <p:txBody>
+          <a:bodyPr rtlCol="0" anchor="ctr"/>
+          <a:lstStyle/>
+          <a:p>
+            <a:pPr algn="ctr"/>
+            <a:endParaRPr lang="en-US"/>
           </a:p>
         </p:txBody>
       </p:sp>
       <p:pic>
         <p:nvPicPr>
-          <p:cNvPr id="3074" name="Picture 2">
+          <p:cNvPr id="1026" name="Picture 2">
             <a:extLst>
               <a:ext uri="{FF2B5EF4-FFF2-40B4-BE49-F238E27FC236}">
-                <a16:creationId xmlns:a16="http://schemas.microsoft.com/office/drawing/2014/main" id="{B3CF8EA0-48B6-4879-A06C-FE0C57B63323}"/>
+                <a16:creationId xmlns:a16="http://schemas.microsoft.com/office/drawing/2014/main" id="{69EDA25D-891B-4308-9776-1EF3CF0F487C}"/>
               </a:ext>
             </a:extLst>
           </p:cNvPr>
@@ -4102,8 +4104,8 @@
         </p:blipFill>
         <p:spPr bwMode="auto">
           <a:xfrm>
-            <a:off x="615634" y="1073741"/>
-            <a:ext cx="10563225" cy="4248150"/>
+            <a:off x="917576" y="1362382"/>
+            <a:ext cx="4352925" cy="7143750"/>
           </a:xfrm>
           <a:prstGeom prst="rect">
             <a:avLst/>
@@ -4122,10 +4124,10 @@
       </p:pic>
       <p:pic>
         <p:nvPicPr>
-          <p:cNvPr id="3076" name="Picture 4">
+          <p:cNvPr id="1028" name="Picture 4">
             <a:extLst>
               <a:ext uri="{FF2B5EF4-FFF2-40B4-BE49-F238E27FC236}">
-                <a16:creationId xmlns:a16="http://schemas.microsoft.com/office/drawing/2014/main" id="{DEB1BAE8-17C0-4A16-AAC9-D50A8C454B24}"/>
+                <a16:creationId xmlns:a16="http://schemas.microsoft.com/office/drawing/2014/main" id="{530E3B0C-1342-489C-8E6B-86B14358EA05}"/>
               </a:ext>
             </a:extLst>
           </p:cNvPr>
@@ -4149,8 +4151,8 @@
         </p:blipFill>
         <p:spPr bwMode="auto">
           <a:xfrm>
-            <a:off x="423244" y="6132228"/>
-            <a:ext cx="11839575" cy="4295775"/>
+            <a:off x="6128418" y="1362382"/>
+            <a:ext cx="4362450" cy="5695950"/>
           </a:xfrm>
           <a:prstGeom prst="rect">
             <a:avLst/>
@@ -4169,10 +4171,10 @@
       </p:pic>
       <p:pic>
         <p:nvPicPr>
-          <p:cNvPr id="3078" name="Picture 6">
+          <p:cNvPr id="1030" name="Picture 6">
             <a:extLst>
               <a:ext uri="{FF2B5EF4-FFF2-40B4-BE49-F238E27FC236}">
-                <a16:creationId xmlns:a16="http://schemas.microsoft.com/office/drawing/2014/main" id="{5EF59F0C-200E-4D05-B4F7-80FAFAD73FD4}"/>
+                <a16:creationId xmlns:a16="http://schemas.microsoft.com/office/drawing/2014/main" id="{CBB48845-AE4A-4CAA-8E18-09441447A585}"/>
               </a:ext>
             </a:extLst>
           </p:cNvPr>
@@ -4196,8 +4198,8 @@
         </p:blipFill>
         <p:spPr bwMode="auto">
           <a:xfrm>
-            <a:off x="429577" y="10870011"/>
-            <a:ext cx="10144125" cy="4314825"/>
+            <a:off x="11222205" y="1250921"/>
+            <a:ext cx="4343400" cy="6515100"/>
           </a:xfrm>
           <a:prstGeom prst="rect">
             <a:avLst/>
@@ -4216,10 +4218,10 @@
       </p:pic>
       <p:pic>
         <p:nvPicPr>
-          <p:cNvPr id="1026" name="Picture 2">
+          <p:cNvPr id="1032" name="Picture 8">
             <a:extLst>
               <a:ext uri="{FF2B5EF4-FFF2-40B4-BE49-F238E27FC236}">
-                <a16:creationId xmlns:a16="http://schemas.microsoft.com/office/drawing/2014/main" id="{D9D497AE-E1BE-4762-958D-BA617F7F7073}"/>
+                <a16:creationId xmlns:a16="http://schemas.microsoft.com/office/drawing/2014/main" id="{532E1D51-1A2C-4EA9-B47B-7869663516CF}"/>
               </a:ext>
             </a:extLst>
           </p:cNvPr>
@@ -4243,8 +4245,8 @@
         </p:blipFill>
         <p:spPr bwMode="auto">
           <a:xfrm>
-            <a:off x="423244" y="15984810"/>
-            <a:ext cx="7229475" cy="4171950"/>
+            <a:off x="908051" y="10315576"/>
+            <a:ext cx="4362450" cy="5695950"/>
           </a:xfrm>
           <a:prstGeom prst="rect">
             <a:avLst/>
@@ -4261,12 +4263,59 @@
           </a:extLst>
         </p:spPr>
       </p:pic>
-      <p:sp>
-        <p:nvSpPr>
-          <p:cNvPr id="2" name="TextBox 1">
+      <p:pic>
+        <p:nvPicPr>
+          <p:cNvPr id="1034" name="Picture 10">
             <a:extLst>
               <a:ext uri="{FF2B5EF4-FFF2-40B4-BE49-F238E27FC236}">
-                <a16:creationId xmlns:a16="http://schemas.microsoft.com/office/drawing/2014/main" id="{18952644-4033-405D-AF02-3E56C82E47CC}"/>
+                <a16:creationId xmlns:a16="http://schemas.microsoft.com/office/drawing/2014/main" id="{0FF213B1-B22F-4694-800F-0A3536A430CF}"/>
+              </a:ext>
+            </a:extLst>
+          </p:cNvPr>
+          <p:cNvPicPr>
+            <a:picLocks noChangeAspect="1" noChangeArrowheads="1"/>
+          </p:cNvPicPr>
+          <p:nvPr/>
+        </p:nvPicPr>
+        <p:blipFill>
+          <a:blip r:embed="rId6">
+            <a:extLst>
+              <a:ext uri="{28A0092B-C50C-407E-A947-70E740481C1C}">
+                <a14:useLocalDpi xmlns:a14="http://schemas.microsoft.com/office/drawing/2010/main" val="0"/>
+              </a:ext>
+            </a:extLst>
+          </a:blip>
+          <a:srcRect/>
+          <a:stretch>
+            <a:fillRect/>
+          </a:stretch>
+        </p:blipFill>
+        <p:spPr bwMode="auto">
+          <a:xfrm>
+            <a:off x="6271293" y="10315576"/>
+            <a:ext cx="4219575" cy="6105525"/>
+          </a:xfrm>
+          <a:prstGeom prst="rect">
+            <a:avLst/>
+          </a:prstGeom>
+          <a:noFill/>
+          <a:extLst>
+            <a:ext uri="{909E8E84-426E-40DD-AFC4-6F175D3DCCD1}">
+              <a14:hiddenFill xmlns:a14="http://schemas.microsoft.com/office/drawing/2010/main">
+                <a:solidFill>
+                  <a:srgbClr val="FFFFFF"/>
+                </a:solidFill>
+              </a14:hiddenFill>
+            </a:ext>
+          </a:extLst>
+        </p:spPr>
+      </p:pic>
+      <p:sp>
+        <p:nvSpPr>
+          <p:cNvPr id="4" name="TextBox 3">
+            <a:extLst>
+              <a:ext uri="{FF2B5EF4-FFF2-40B4-BE49-F238E27FC236}">
+                <a16:creationId xmlns:a16="http://schemas.microsoft.com/office/drawing/2014/main" id="{21222866-BF30-4EF8-9315-45462C6727FC}"/>
               </a:ext>
             </a:extLst>
           </p:cNvPr>
@@ -4275,7 +4324,827 @@
         </p:nvSpPr>
         <p:spPr>
           <a:xfrm>
-            <a:off x="423244" y="15230880"/>
+            <a:off x="686094" y="247314"/>
+            <a:ext cx="5314949" cy="1015663"/>
+          </a:xfrm>
+          <a:prstGeom prst="rect">
+            <a:avLst/>
+          </a:prstGeom>
+          <a:noFill/>
+        </p:spPr>
+        <p:txBody>
+          <a:bodyPr wrap="square" rtlCol="0">
+            <a:spAutoFit/>
+          </a:bodyPr>
+          <a:lstStyle/>
+          <a:p>
+            <a:r>
+              <a:rPr lang="en-US" sz="4000" b="1" dirty="0">
+                <a:latin typeface="Arial" panose="020B0604020202020204" pitchFamily="34" charset="0"/>
+                <a:cs typeface="Arial" panose="020B0604020202020204" pitchFamily="34" charset="0"/>
+              </a:rPr>
+              <a:t>A</a:t>
+            </a:r>
+            <a:r>
+              <a:rPr lang="en-US" sz="4000" dirty="0">
+                <a:latin typeface="Arial" panose="020B0604020202020204" pitchFamily="34" charset="0"/>
+                <a:cs typeface="Arial" panose="020B0604020202020204" pitchFamily="34" charset="0"/>
+              </a:rPr>
+              <a:t>) </a:t>
+            </a:r>
+            <a:r>
+              <a:rPr lang="en-US" sz="4000" i="1" dirty="0">
+                <a:latin typeface="Arial" panose="020B0604020202020204" pitchFamily="34" charset="0"/>
+                <a:cs typeface="Arial" panose="020B0604020202020204" pitchFamily="34" charset="0"/>
+              </a:rPr>
+              <a:t>E. faecalis </a:t>
+            </a:r>
+            <a:r>
+              <a:rPr lang="en-US" sz="4000" dirty="0">
+                <a:latin typeface="Arial" panose="020B0604020202020204" pitchFamily="34" charset="0"/>
+                <a:cs typeface="Arial" panose="020B0604020202020204" pitchFamily="34" charset="0"/>
+              </a:rPr>
+              <a:t>Yi6-1</a:t>
+            </a:r>
+          </a:p>
+          <a:p>
+            <a:r>
+              <a:rPr lang="en-US" sz="2000" dirty="0">
+                <a:latin typeface="Arial" panose="020B0604020202020204" pitchFamily="34" charset="0"/>
+                <a:cs typeface="Arial" panose="020B0604020202020204" pitchFamily="34" charset="0"/>
+              </a:rPr>
+              <a:t>	Individual phages </a:t>
+            </a:r>
+            <a:r>
+              <a:rPr lang="en-US" sz="2000" b="1" dirty="0">
+                <a:latin typeface="Arial" panose="020B0604020202020204" pitchFamily="34" charset="0"/>
+                <a:cs typeface="Arial" panose="020B0604020202020204" pitchFamily="34" charset="0"/>
+              </a:rPr>
+              <a:t>don’t</a:t>
+            </a:r>
+            <a:r>
+              <a:rPr lang="en-US" sz="2000" dirty="0">
+                <a:latin typeface="Arial" panose="020B0604020202020204" pitchFamily="34" charset="0"/>
+                <a:cs typeface="Arial" panose="020B0604020202020204" pitchFamily="34" charset="0"/>
+              </a:rPr>
+              <a:t> clear host</a:t>
+            </a:r>
+            <a:endParaRPr lang="en-US" sz="2000" b="1" dirty="0">
+              <a:latin typeface="Arial" panose="020B0604020202020204" pitchFamily="34" charset="0"/>
+              <a:cs typeface="Arial" panose="020B0604020202020204" pitchFamily="34" charset="0"/>
+            </a:endParaRPr>
+          </a:p>
+        </p:txBody>
+      </p:sp>
+      <p:sp>
+        <p:nvSpPr>
+          <p:cNvPr id="5" name="TextBox 4">
+            <a:extLst>
+              <a:ext uri="{FF2B5EF4-FFF2-40B4-BE49-F238E27FC236}">
+                <a16:creationId xmlns:a16="http://schemas.microsoft.com/office/drawing/2014/main" id="{B4F2E14C-26CF-41D0-A3B8-C548A3DEAE0A}"/>
+              </a:ext>
+            </a:extLst>
+          </p:cNvPr>
+          <p:cNvSpPr txBox="1"/>
+          <p:nvPr/>
+        </p:nvSpPr>
+        <p:spPr>
+          <a:xfrm>
+            <a:off x="11711268" y="235258"/>
+            <a:ext cx="5022570" cy="707886"/>
+          </a:xfrm>
+          <a:prstGeom prst="rect">
+            <a:avLst/>
+          </a:prstGeom>
+          <a:noFill/>
+        </p:spPr>
+        <p:txBody>
+          <a:bodyPr wrap="square" rtlCol="0">
+            <a:spAutoFit/>
+          </a:bodyPr>
+          <a:lstStyle/>
+          <a:p>
+            <a:r>
+              <a:rPr lang="en-US" sz="4000" b="1" dirty="0">
+                <a:latin typeface="Arial" panose="020B0604020202020204" pitchFamily="34" charset="0"/>
+                <a:cs typeface="Arial" panose="020B0604020202020204" pitchFamily="34" charset="0"/>
+              </a:rPr>
+              <a:t>C</a:t>
+            </a:r>
+            <a:r>
+              <a:rPr lang="en-US" sz="4000" dirty="0">
+                <a:latin typeface="Arial" panose="020B0604020202020204" pitchFamily="34" charset="0"/>
+                <a:cs typeface="Arial" panose="020B0604020202020204" pitchFamily="34" charset="0"/>
+              </a:rPr>
+              <a:t>) </a:t>
+            </a:r>
+            <a:r>
+              <a:rPr lang="en-US" sz="4000" i="1" dirty="0">
+                <a:latin typeface="Arial" panose="020B0604020202020204" pitchFamily="34" charset="0"/>
+                <a:cs typeface="Arial" panose="020B0604020202020204" pitchFamily="34" charset="0"/>
+              </a:rPr>
+              <a:t>E. faecalis </a:t>
+            </a:r>
+            <a:r>
+              <a:rPr lang="en-US" sz="4000" dirty="0">
+                <a:latin typeface="Arial" panose="020B0604020202020204" pitchFamily="34" charset="0"/>
+                <a:cs typeface="Arial" panose="020B0604020202020204" pitchFamily="34" charset="0"/>
+              </a:rPr>
+              <a:t>EF06</a:t>
+            </a:r>
+            <a:endParaRPr lang="en-US" sz="4000" b="1" dirty="0">
+              <a:latin typeface="Arial" panose="020B0604020202020204" pitchFamily="34" charset="0"/>
+              <a:cs typeface="Arial" panose="020B0604020202020204" pitchFamily="34" charset="0"/>
+            </a:endParaRPr>
+          </a:p>
+        </p:txBody>
+      </p:sp>
+      <p:sp>
+        <p:nvSpPr>
+          <p:cNvPr id="6" name="TextBox 5">
+            <a:extLst>
+              <a:ext uri="{FF2B5EF4-FFF2-40B4-BE49-F238E27FC236}">
+                <a16:creationId xmlns:a16="http://schemas.microsoft.com/office/drawing/2014/main" id="{F3BD6282-AEB8-46DA-917E-496C3D63F179}"/>
+              </a:ext>
+            </a:extLst>
+          </p:cNvPr>
+          <p:cNvSpPr txBox="1"/>
+          <p:nvPr/>
+        </p:nvSpPr>
+        <p:spPr>
+          <a:xfrm>
+            <a:off x="686094" y="9401176"/>
+            <a:ext cx="4584407" cy="707886"/>
+          </a:xfrm>
+          <a:prstGeom prst="rect">
+            <a:avLst/>
+          </a:prstGeom>
+          <a:noFill/>
+        </p:spPr>
+        <p:txBody>
+          <a:bodyPr wrap="square" rtlCol="0">
+            <a:spAutoFit/>
+          </a:bodyPr>
+          <a:lstStyle/>
+          <a:p>
+            <a:r>
+              <a:rPr lang="en-US" sz="4000" b="1" dirty="0">
+                <a:latin typeface="Arial" panose="020B0604020202020204" pitchFamily="34" charset="0"/>
+                <a:cs typeface="Arial" panose="020B0604020202020204" pitchFamily="34" charset="0"/>
+              </a:rPr>
+              <a:t>D</a:t>
+            </a:r>
+            <a:r>
+              <a:rPr lang="en-US" sz="4000" dirty="0">
+                <a:latin typeface="Arial" panose="020B0604020202020204" pitchFamily="34" charset="0"/>
+                <a:cs typeface="Arial" panose="020B0604020202020204" pitchFamily="34" charset="0"/>
+              </a:rPr>
+              <a:t>) </a:t>
+            </a:r>
+            <a:r>
+              <a:rPr lang="en-US" sz="4000" i="1" dirty="0">
+                <a:latin typeface="Arial" panose="020B0604020202020204" pitchFamily="34" charset="0"/>
+                <a:cs typeface="Arial" panose="020B0604020202020204" pitchFamily="34" charset="0"/>
+              </a:rPr>
+              <a:t>E. faecalis </a:t>
+            </a:r>
+            <a:r>
+              <a:rPr lang="en-US" sz="4000" dirty="0">
+                <a:latin typeface="Arial" panose="020B0604020202020204" pitchFamily="34" charset="0"/>
+                <a:cs typeface="Arial" panose="020B0604020202020204" pitchFamily="34" charset="0"/>
+              </a:rPr>
+              <a:t>Ef11</a:t>
+            </a:r>
+            <a:endParaRPr lang="en-US" sz="4000" b="1" dirty="0">
+              <a:latin typeface="Arial" panose="020B0604020202020204" pitchFamily="34" charset="0"/>
+              <a:cs typeface="Arial" panose="020B0604020202020204" pitchFamily="34" charset="0"/>
+            </a:endParaRPr>
+          </a:p>
+        </p:txBody>
+      </p:sp>
+      <p:sp>
+        <p:nvSpPr>
+          <p:cNvPr id="7" name="TextBox 6">
+            <a:extLst>
+              <a:ext uri="{FF2B5EF4-FFF2-40B4-BE49-F238E27FC236}">
+                <a16:creationId xmlns:a16="http://schemas.microsoft.com/office/drawing/2014/main" id="{CA3DC903-3DAF-4FA7-B1DE-414956DB6228}"/>
+              </a:ext>
+            </a:extLst>
+          </p:cNvPr>
+          <p:cNvSpPr txBox="1"/>
+          <p:nvPr/>
+        </p:nvSpPr>
+        <p:spPr>
+          <a:xfrm>
+            <a:off x="6194745" y="9401176"/>
+            <a:ext cx="4584408" cy="707886"/>
+          </a:xfrm>
+          <a:prstGeom prst="rect">
+            <a:avLst/>
+          </a:prstGeom>
+          <a:noFill/>
+        </p:spPr>
+        <p:txBody>
+          <a:bodyPr wrap="square" rtlCol="0">
+            <a:spAutoFit/>
+          </a:bodyPr>
+          <a:lstStyle/>
+          <a:p>
+            <a:r>
+              <a:rPr lang="en-US" sz="4000" b="1" dirty="0">
+                <a:latin typeface="Arial" panose="020B0604020202020204" pitchFamily="34" charset="0"/>
+                <a:cs typeface="Arial" panose="020B0604020202020204" pitchFamily="34" charset="0"/>
+              </a:rPr>
+              <a:t>E</a:t>
+            </a:r>
+            <a:r>
+              <a:rPr lang="en-US" sz="4000" dirty="0">
+                <a:latin typeface="Arial" panose="020B0604020202020204" pitchFamily="34" charset="0"/>
+                <a:cs typeface="Arial" panose="020B0604020202020204" pitchFamily="34" charset="0"/>
+              </a:rPr>
+              <a:t>) </a:t>
+            </a:r>
+            <a:r>
+              <a:rPr lang="en-US" sz="4000" i="1" dirty="0">
+                <a:latin typeface="Arial" panose="020B0604020202020204" pitchFamily="34" charset="0"/>
+                <a:cs typeface="Arial" panose="020B0604020202020204" pitchFamily="34" charset="0"/>
+              </a:rPr>
+              <a:t>E. faecalis </a:t>
+            </a:r>
+            <a:r>
+              <a:rPr lang="en-US" sz="4000" dirty="0">
+                <a:latin typeface="Arial" panose="020B0604020202020204" pitchFamily="34" charset="0"/>
+                <a:cs typeface="Arial" panose="020B0604020202020204" pitchFamily="34" charset="0"/>
+              </a:rPr>
+              <a:t>V587</a:t>
+            </a:r>
+            <a:endParaRPr lang="en-US" sz="4000" b="1" dirty="0">
+              <a:latin typeface="Arial" panose="020B0604020202020204" pitchFamily="34" charset="0"/>
+              <a:cs typeface="Arial" panose="020B0604020202020204" pitchFamily="34" charset="0"/>
+            </a:endParaRPr>
+          </a:p>
+        </p:txBody>
+      </p:sp>
+      <p:sp>
+        <p:nvSpPr>
+          <p:cNvPr id="8" name="TextBox 7">
+            <a:extLst>
+              <a:ext uri="{FF2B5EF4-FFF2-40B4-BE49-F238E27FC236}">
+                <a16:creationId xmlns:a16="http://schemas.microsoft.com/office/drawing/2014/main" id="{40B3FAFD-EBEC-462C-BF0A-6D6C9E42A978}"/>
+              </a:ext>
+            </a:extLst>
+          </p:cNvPr>
+          <p:cNvSpPr txBox="1"/>
+          <p:nvPr/>
+        </p:nvSpPr>
+        <p:spPr>
+          <a:xfrm>
+            <a:off x="6194745" y="235258"/>
+            <a:ext cx="5314949" cy="1015663"/>
+          </a:xfrm>
+          <a:prstGeom prst="rect">
+            <a:avLst/>
+          </a:prstGeom>
+          <a:noFill/>
+        </p:spPr>
+        <p:txBody>
+          <a:bodyPr wrap="square" rtlCol="0">
+            <a:spAutoFit/>
+          </a:bodyPr>
+          <a:lstStyle/>
+          <a:p>
+            <a:r>
+              <a:rPr lang="en-US" sz="4000" b="1" dirty="0">
+                <a:latin typeface="Arial" panose="020B0604020202020204" pitchFamily="34" charset="0"/>
+                <a:cs typeface="Arial" panose="020B0604020202020204" pitchFamily="34" charset="0"/>
+              </a:rPr>
+              <a:t>B</a:t>
+            </a:r>
+            <a:r>
+              <a:rPr lang="en-US" sz="4000" dirty="0">
+                <a:latin typeface="Arial" panose="020B0604020202020204" pitchFamily="34" charset="0"/>
+                <a:cs typeface="Arial" panose="020B0604020202020204" pitchFamily="34" charset="0"/>
+              </a:rPr>
+              <a:t>) </a:t>
+            </a:r>
+            <a:r>
+              <a:rPr lang="en-US" sz="4000" i="1" dirty="0">
+                <a:latin typeface="Arial" panose="020B0604020202020204" pitchFamily="34" charset="0"/>
+                <a:cs typeface="Arial" panose="020B0604020202020204" pitchFamily="34" charset="0"/>
+              </a:rPr>
+              <a:t>E. faecalis </a:t>
+            </a:r>
+            <a:r>
+              <a:rPr lang="en-US" sz="4000" dirty="0">
+                <a:latin typeface="Arial" panose="020B0604020202020204" pitchFamily="34" charset="0"/>
+                <a:cs typeface="Arial" panose="020B0604020202020204" pitchFamily="34" charset="0"/>
+              </a:rPr>
+              <a:t>Yi6-1</a:t>
+            </a:r>
+          </a:p>
+          <a:p>
+            <a:r>
+              <a:rPr lang="en-US" sz="2000" dirty="0">
+                <a:latin typeface="Arial" panose="020B0604020202020204" pitchFamily="34" charset="0"/>
+                <a:cs typeface="Arial" panose="020B0604020202020204" pitchFamily="34" charset="0"/>
+              </a:rPr>
+              <a:t>	Individual phages </a:t>
+            </a:r>
+            <a:r>
+              <a:rPr lang="en-US" sz="2000" b="1" dirty="0">
+                <a:latin typeface="Arial" panose="020B0604020202020204" pitchFamily="34" charset="0"/>
+                <a:cs typeface="Arial" panose="020B0604020202020204" pitchFamily="34" charset="0"/>
+              </a:rPr>
+              <a:t>do</a:t>
+            </a:r>
+            <a:r>
+              <a:rPr lang="en-US" sz="2000" dirty="0">
+                <a:latin typeface="Arial" panose="020B0604020202020204" pitchFamily="34" charset="0"/>
+                <a:cs typeface="Arial" panose="020B0604020202020204" pitchFamily="34" charset="0"/>
+              </a:rPr>
+              <a:t> clear host</a:t>
+            </a:r>
+            <a:endParaRPr lang="en-US" sz="2000" b="1" dirty="0">
+              <a:latin typeface="Arial" panose="020B0604020202020204" pitchFamily="34" charset="0"/>
+              <a:cs typeface="Arial" panose="020B0604020202020204" pitchFamily="34" charset="0"/>
+            </a:endParaRPr>
+          </a:p>
+        </p:txBody>
+      </p:sp>
+    </p:spTree>
+    <p:extLst>
+      <p:ext uri="{BB962C8B-B14F-4D97-AF65-F5344CB8AC3E}">
+        <p14:creationId xmlns:p14="http://schemas.microsoft.com/office/powerpoint/2010/main" val="529604342"/>
+      </p:ext>
+    </p:extLst>
+  </p:cSld>
+  <p:clrMapOvr>
+    <a:masterClrMapping/>
+  </p:clrMapOvr>
+</p:sld>
+</file>
+
+<file path=ppt/slides/slide4.xml><?xml version="1.0" encoding="utf-8"?>
+<p:sld xmlns:a="http://schemas.openxmlformats.org/drawingml/2006/main" xmlns:r="http://schemas.openxmlformats.org/officeDocument/2006/relationships" xmlns:p="http://schemas.openxmlformats.org/presentationml/2006/main">
+  <p:cSld>
+    <p:spTree>
+      <p:nvGrpSpPr>
+        <p:cNvPr id="1" name=""/>
+        <p:cNvGrpSpPr/>
+        <p:nvPr/>
+      </p:nvGrpSpPr>
+      <p:grpSpPr>
+        <a:xfrm>
+          <a:off x="0" y="0"/>
+          <a:ext cx="0" cy="0"/>
+          <a:chOff x="0" y="0"/>
+          <a:chExt cx="0" cy="0"/>
+        </a:xfrm>
+      </p:grpSpPr>
+      <p:sp>
+        <p:nvSpPr>
+          <p:cNvPr id="3" name="Rectangle 2">
+            <a:extLst>
+              <a:ext uri="{FF2B5EF4-FFF2-40B4-BE49-F238E27FC236}">
+                <a16:creationId xmlns:a16="http://schemas.microsoft.com/office/drawing/2014/main" id="{70BD1B5C-79CB-4489-9126-B399682E77C9}"/>
+              </a:ext>
+            </a:extLst>
+          </p:cNvPr>
+          <p:cNvSpPr/>
+          <p:nvPr/>
+        </p:nvSpPr>
+        <p:spPr>
+          <a:xfrm>
+            <a:off x="0" y="322395"/>
+            <a:ext cx="12771120" cy="19486762"/>
+          </a:xfrm>
+          <a:prstGeom prst="rect">
+            <a:avLst/>
+          </a:prstGeom>
+          <a:solidFill>
+            <a:schemeClr val="bg1"/>
+          </a:solidFill>
+          <a:ln>
+            <a:noFill/>
+          </a:ln>
+        </p:spPr>
+        <p:style>
+          <a:lnRef idx="2">
+            <a:schemeClr val="accent1">
+              <a:shade val="50000"/>
+            </a:schemeClr>
+          </a:lnRef>
+          <a:fillRef idx="1">
+            <a:schemeClr val="accent1"/>
+          </a:fillRef>
+          <a:effectRef idx="0">
+            <a:schemeClr val="accent1"/>
+          </a:effectRef>
+          <a:fontRef idx="minor">
+            <a:schemeClr val="lt1"/>
+          </a:fontRef>
+        </p:style>
+        <p:txBody>
+          <a:bodyPr rtlCol="0" anchor="ctr"/>
+          <a:lstStyle/>
+          <a:p>
+            <a:pPr algn="ctr"/>
+            <a:endParaRPr lang="en-US"/>
+          </a:p>
+        </p:txBody>
+      </p:sp>
+      <p:sp>
+        <p:nvSpPr>
+          <p:cNvPr id="4" name="TextBox 3">
+            <a:extLst>
+              <a:ext uri="{FF2B5EF4-FFF2-40B4-BE49-F238E27FC236}">
+                <a16:creationId xmlns:a16="http://schemas.microsoft.com/office/drawing/2014/main" id="{1A0A423D-5221-41EC-982A-095F6F1B0BCA}"/>
+              </a:ext>
+            </a:extLst>
+          </p:cNvPr>
+          <p:cNvSpPr txBox="1"/>
+          <p:nvPr/>
+        </p:nvSpPr>
+        <p:spPr>
+          <a:xfrm>
+            <a:off x="423244" y="322395"/>
+            <a:ext cx="5078396" cy="707886"/>
+          </a:xfrm>
+          <a:prstGeom prst="rect">
+            <a:avLst/>
+          </a:prstGeom>
+          <a:noFill/>
+        </p:spPr>
+        <p:txBody>
+          <a:bodyPr wrap="square" rtlCol="0">
+            <a:spAutoFit/>
+          </a:bodyPr>
+          <a:lstStyle/>
+          <a:p>
+            <a:r>
+              <a:rPr lang="en-US" sz="4000" b="1" dirty="0">
+                <a:latin typeface="Arial" panose="020B0604020202020204" pitchFamily="34" charset="0"/>
+                <a:cs typeface="Arial" panose="020B0604020202020204" pitchFamily="34" charset="0"/>
+              </a:rPr>
+              <a:t>A</a:t>
+            </a:r>
+            <a:r>
+              <a:rPr lang="en-US" sz="4000" dirty="0">
+                <a:latin typeface="Arial" panose="020B0604020202020204" pitchFamily="34" charset="0"/>
+                <a:cs typeface="Arial" panose="020B0604020202020204" pitchFamily="34" charset="0"/>
+              </a:rPr>
+              <a:t>) </a:t>
+            </a:r>
+            <a:r>
+              <a:rPr lang="en-US" sz="4000" i="1" dirty="0">
+                <a:latin typeface="Arial" panose="020B0604020202020204" pitchFamily="34" charset="0"/>
+                <a:cs typeface="Arial" panose="020B0604020202020204" pitchFamily="34" charset="0"/>
+              </a:rPr>
+              <a:t>E. faecalis </a:t>
+            </a:r>
+            <a:r>
+              <a:rPr lang="en-US" sz="4000" dirty="0">
+                <a:latin typeface="Arial" panose="020B0604020202020204" pitchFamily="34" charset="0"/>
+                <a:cs typeface="Arial" panose="020B0604020202020204" pitchFamily="34" charset="0"/>
+              </a:rPr>
+              <a:t>Yi6-1</a:t>
+            </a:r>
+            <a:endParaRPr lang="en-US" sz="4000" b="1" dirty="0">
+              <a:latin typeface="Arial" panose="020B0604020202020204" pitchFamily="34" charset="0"/>
+              <a:cs typeface="Arial" panose="020B0604020202020204" pitchFamily="34" charset="0"/>
+            </a:endParaRPr>
+          </a:p>
+        </p:txBody>
+      </p:sp>
+      <p:sp>
+        <p:nvSpPr>
+          <p:cNvPr id="5" name="TextBox 4">
+            <a:extLst>
+              <a:ext uri="{FF2B5EF4-FFF2-40B4-BE49-F238E27FC236}">
+                <a16:creationId xmlns:a16="http://schemas.microsoft.com/office/drawing/2014/main" id="{11306143-D5BF-4A46-91BC-5133E33DBB2F}"/>
+              </a:ext>
+            </a:extLst>
+          </p:cNvPr>
+          <p:cNvSpPr txBox="1"/>
+          <p:nvPr/>
+        </p:nvSpPr>
+        <p:spPr>
+          <a:xfrm>
+            <a:off x="423244" y="5365351"/>
+            <a:ext cx="5709354" cy="707886"/>
+          </a:xfrm>
+          <a:prstGeom prst="rect">
+            <a:avLst/>
+          </a:prstGeom>
+          <a:noFill/>
+        </p:spPr>
+        <p:txBody>
+          <a:bodyPr wrap="square" rtlCol="0">
+            <a:spAutoFit/>
+          </a:bodyPr>
+          <a:lstStyle/>
+          <a:p>
+            <a:r>
+              <a:rPr lang="en-US" sz="4000" b="1" dirty="0">
+                <a:latin typeface="Arial" panose="020B0604020202020204" pitchFamily="34" charset="0"/>
+                <a:cs typeface="Arial" panose="020B0604020202020204" pitchFamily="34" charset="0"/>
+              </a:rPr>
+              <a:t>B</a:t>
+            </a:r>
+            <a:r>
+              <a:rPr lang="en-US" sz="4000" dirty="0">
+                <a:latin typeface="Arial" panose="020B0604020202020204" pitchFamily="34" charset="0"/>
+                <a:cs typeface="Arial" panose="020B0604020202020204" pitchFamily="34" charset="0"/>
+              </a:rPr>
+              <a:t>) </a:t>
+            </a:r>
+            <a:r>
+              <a:rPr lang="en-US" sz="4000" i="1" dirty="0">
+                <a:latin typeface="Arial" panose="020B0604020202020204" pitchFamily="34" charset="0"/>
+                <a:cs typeface="Arial" panose="020B0604020202020204" pitchFamily="34" charset="0"/>
+              </a:rPr>
+              <a:t>E. faecalis </a:t>
+            </a:r>
+            <a:r>
+              <a:rPr lang="en-US" sz="4000" dirty="0">
+                <a:latin typeface="Arial" panose="020B0604020202020204" pitchFamily="34" charset="0"/>
+                <a:cs typeface="Arial" panose="020B0604020202020204" pitchFamily="34" charset="0"/>
+              </a:rPr>
+              <a:t>EF06</a:t>
+            </a:r>
+            <a:endParaRPr lang="en-US" sz="4000" b="1" dirty="0">
+              <a:latin typeface="Arial" panose="020B0604020202020204" pitchFamily="34" charset="0"/>
+              <a:cs typeface="Arial" panose="020B0604020202020204" pitchFamily="34" charset="0"/>
+            </a:endParaRPr>
+          </a:p>
+        </p:txBody>
+      </p:sp>
+      <p:sp>
+        <p:nvSpPr>
+          <p:cNvPr id="6" name="TextBox 5">
+            <a:extLst>
+              <a:ext uri="{FF2B5EF4-FFF2-40B4-BE49-F238E27FC236}">
+                <a16:creationId xmlns:a16="http://schemas.microsoft.com/office/drawing/2014/main" id="{27604841-55A7-45C6-A64B-03FA0F2446B6}"/>
+              </a:ext>
+            </a:extLst>
+          </p:cNvPr>
+          <p:cNvSpPr txBox="1"/>
+          <p:nvPr/>
+        </p:nvSpPr>
+        <p:spPr>
+          <a:xfrm>
+            <a:off x="423244" y="10116081"/>
+            <a:ext cx="5078396" cy="707886"/>
+          </a:xfrm>
+          <a:prstGeom prst="rect">
+            <a:avLst/>
+          </a:prstGeom>
+          <a:noFill/>
+        </p:spPr>
+        <p:txBody>
+          <a:bodyPr wrap="square" rtlCol="0">
+            <a:spAutoFit/>
+          </a:bodyPr>
+          <a:lstStyle/>
+          <a:p>
+            <a:r>
+              <a:rPr lang="en-US" sz="4000" b="1" dirty="0">
+                <a:latin typeface="Arial" panose="020B0604020202020204" pitchFamily="34" charset="0"/>
+                <a:cs typeface="Arial" panose="020B0604020202020204" pitchFamily="34" charset="0"/>
+              </a:rPr>
+              <a:t>C</a:t>
+            </a:r>
+            <a:r>
+              <a:rPr lang="en-US" sz="4000" dirty="0">
+                <a:latin typeface="Arial" panose="020B0604020202020204" pitchFamily="34" charset="0"/>
+                <a:cs typeface="Arial" panose="020B0604020202020204" pitchFamily="34" charset="0"/>
+              </a:rPr>
+              <a:t>) </a:t>
+            </a:r>
+            <a:r>
+              <a:rPr lang="en-US" sz="4000" i="1" dirty="0">
+                <a:latin typeface="Arial" panose="020B0604020202020204" pitchFamily="34" charset="0"/>
+                <a:cs typeface="Arial" panose="020B0604020202020204" pitchFamily="34" charset="0"/>
+              </a:rPr>
+              <a:t>E. faecalis </a:t>
+            </a:r>
+            <a:r>
+              <a:rPr lang="en-US" sz="4000" dirty="0">
+                <a:latin typeface="Arial" panose="020B0604020202020204" pitchFamily="34" charset="0"/>
+                <a:cs typeface="Arial" panose="020B0604020202020204" pitchFamily="34" charset="0"/>
+              </a:rPr>
+              <a:t>EF11</a:t>
+            </a:r>
+            <a:endParaRPr lang="en-US" sz="4000" b="1" dirty="0">
+              <a:latin typeface="Arial" panose="020B0604020202020204" pitchFamily="34" charset="0"/>
+              <a:cs typeface="Arial" panose="020B0604020202020204" pitchFamily="34" charset="0"/>
+            </a:endParaRPr>
+          </a:p>
+        </p:txBody>
+      </p:sp>
+      <p:pic>
+        <p:nvPicPr>
+          <p:cNvPr id="3074" name="Picture 2">
+            <a:extLst>
+              <a:ext uri="{FF2B5EF4-FFF2-40B4-BE49-F238E27FC236}">
+                <a16:creationId xmlns:a16="http://schemas.microsoft.com/office/drawing/2014/main" id="{B3CF8EA0-48B6-4879-A06C-FE0C57B63323}"/>
+              </a:ext>
+            </a:extLst>
+          </p:cNvPr>
+          <p:cNvPicPr>
+            <a:picLocks noChangeAspect="1" noChangeArrowheads="1"/>
+          </p:cNvPicPr>
+          <p:nvPr/>
+        </p:nvPicPr>
+        <p:blipFill>
+          <a:blip r:embed="rId2">
+            <a:extLst>
+              <a:ext uri="{28A0092B-C50C-407E-A947-70E740481C1C}">
+                <a14:useLocalDpi xmlns:a14="http://schemas.microsoft.com/office/drawing/2010/main" val="0"/>
+              </a:ext>
+            </a:extLst>
+          </a:blip>
+          <a:srcRect/>
+          <a:stretch>
+            <a:fillRect/>
+          </a:stretch>
+        </p:blipFill>
+        <p:spPr bwMode="auto">
+          <a:xfrm>
+            <a:off x="615634" y="1073741"/>
+            <a:ext cx="10563225" cy="4248150"/>
+          </a:xfrm>
+          <a:prstGeom prst="rect">
+            <a:avLst/>
+          </a:prstGeom>
+          <a:noFill/>
+          <a:extLst>
+            <a:ext uri="{909E8E84-426E-40DD-AFC4-6F175D3DCCD1}">
+              <a14:hiddenFill xmlns:a14="http://schemas.microsoft.com/office/drawing/2010/main">
+                <a:solidFill>
+                  <a:srgbClr val="FFFFFF"/>
+                </a:solidFill>
+              </a14:hiddenFill>
+            </a:ext>
+          </a:extLst>
+        </p:spPr>
+      </p:pic>
+      <p:pic>
+        <p:nvPicPr>
+          <p:cNvPr id="3076" name="Picture 4">
+            <a:extLst>
+              <a:ext uri="{FF2B5EF4-FFF2-40B4-BE49-F238E27FC236}">
+                <a16:creationId xmlns:a16="http://schemas.microsoft.com/office/drawing/2014/main" id="{DEB1BAE8-17C0-4A16-AAC9-D50A8C454B24}"/>
+              </a:ext>
+            </a:extLst>
+          </p:cNvPr>
+          <p:cNvPicPr>
+            <a:picLocks noChangeAspect="1" noChangeArrowheads="1"/>
+          </p:cNvPicPr>
+          <p:nvPr/>
+        </p:nvPicPr>
+        <p:blipFill>
+          <a:blip r:embed="rId3">
+            <a:extLst>
+              <a:ext uri="{28A0092B-C50C-407E-A947-70E740481C1C}">
+                <a14:useLocalDpi xmlns:a14="http://schemas.microsoft.com/office/drawing/2010/main" val="0"/>
+              </a:ext>
+            </a:extLst>
+          </a:blip>
+          <a:srcRect/>
+          <a:stretch>
+            <a:fillRect/>
+          </a:stretch>
+        </p:blipFill>
+        <p:spPr bwMode="auto">
+          <a:xfrm>
+            <a:off x="615634" y="6121865"/>
+            <a:ext cx="11839575" cy="4295775"/>
+          </a:xfrm>
+          <a:prstGeom prst="rect">
+            <a:avLst/>
+          </a:prstGeom>
+          <a:noFill/>
+          <a:extLst>
+            <a:ext uri="{909E8E84-426E-40DD-AFC4-6F175D3DCCD1}">
+              <a14:hiddenFill xmlns:a14="http://schemas.microsoft.com/office/drawing/2010/main">
+                <a:solidFill>
+                  <a:srgbClr val="FFFFFF"/>
+                </a:solidFill>
+              </a14:hiddenFill>
+            </a:ext>
+          </a:extLst>
+        </p:spPr>
+      </p:pic>
+      <p:pic>
+        <p:nvPicPr>
+          <p:cNvPr id="3078" name="Picture 6">
+            <a:extLst>
+              <a:ext uri="{FF2B5EF4-FFF2-40B4-BE49-F238E27FC236}">
+                <a16:creationId xmlns:a16="http://schemas.microsoft.com/office/drawing/2014/main" id="{5EF59F0C-200E-4D05-B4F7-80FAFAD73FD4}"/>
+              </a:ext>
+            </a:extLst>
+          </p:cNvPr>
+          <p:cNvPicPr>
+            <a:picLocks noChangeAspect="1" noChangeArrowheads="1"/>
+          </p:cNvPicPr>
+          <p:nvPr/>
+        </p:nvPicPr>
+        <p:blipFill>
+          <a:blip r:embed="rId4">
+            <a:extLst>
+              <a:ext uri="{28A0092B-C50C-407E-A947-70E740481C1C}">
+                <a14:useLocalDpi xmlns:a14="http://schemas.microsoft.com/office/drawing/2010/main" val="0"/>
+              </a:ext>
+            </a:extLst>
+          </a:blip>
+          <a:srcRect/>
+          <a:stretch>
+            <a:fillRect/>
+          </a:stretch>
+        </p:blipFill>
+        <p:spPr bwMode="auto">
+          <a:xfrm>
+            <a:off x="615634" y="10870011"/>
+            <a:ext cx="10144125" cy="4314825"/>
+          </a:xfrm>
+          <a:prstGeom prst="rect">
+            <a:avLst/>
+          </a:prstGeom>
+          <a:noFill/>
+          <a:extLst>
+            <a:ext uri="{909E8E84-426E-40DD-AFC4-6F175D3DCCD1}">
+              <a14:hiddenFill xmlns:a14="http://schemas.microsoft.com/office/drawing/2010/main">
+                <a:solidFill>
+                  <a:srgbClr val="FFFFFF"/>
+                </a:solidFill>
+              </a14:hiddenFill>
+            </a:ext>
+          </a:extLst>
+        </p:spPr>
+      </p:pic>
+      <p:pic>
+        <p:nvPicPr>
+          <p:cNvPr id="1026" name="Picture 2">
+            <a:extLst>
+              <a:ext uri="{FF2B5EF4-FFF2-40B4-BE49-F238E27FC236}">
+                <a16:creationId xmlns:a16="http://schemas.microsoft.com/office/drawing/2014/main" id="{D9D497AE-E1BE-4762-958D-BA617F7F7073}"/>
+              </a:ext>
+            </a:extLst>
+          </p:cNvPr>
+          <p:cNvPicPr>
+            <a:picLocks noChangeAspect="1" noChangeArrowheads="1"/>
+          </p:cNvPicPr>
+          <p:nvPr/>
+        </p:nvPicPr>
+        <p:blipFill>
+          <a:blip r:embed="rId5">
+            <a:extLst>
+              <a:ext uri="{28A0092B-C50C-407E-A947-70E740481C1C}">
+                <a14:useLocalDpi xmlns:a14="http://schemas.microsoft.com/office/drawing/2010/main" val="0"/>
+              </a:ext>
+            </a:extLst>
+          </a:blip>
+          <a:srcRect/>
+          <a:stretch>
+            <a:fillRect/>
+          </a:stretch>
+        </p:blipFill>
+        <p:spPr bwMode="auto">
+          <a:xfrm>
+            <a:off x="615634" y="15637207"/>
+            <a:ext cx="7229475" cy="4171950"/>
+          </a:xfrm>
+          <a:prstGeom prst="rect">
+            <a:avLst/>
+          </a:prstGeom>
+          <a:noFill/>
+          <a:extLst>
+            <a:ext uri="{909E8E84-426E-40DD-AFC4-6F175D3DCCD1}">
+              <a14:hiddenFill xmlns:a14="http://schemas.microsoft.com/office/drawing/2010/main">
+                <a:solidFill>
+                  <a:srgbClr val="FFFFFF"/>
+                </a:solidFill>
+              </a14:hiddenFill>
+            </a:ext>
+          </a:extLst>
+        </p:spPr>
+      </p:pic>
+      <p:sp>
+        <p:nvSpPr>
+          <p:cNvPr id="2" name="TextBox 1">
+            <a:extLst>
+              <a:ext uri="{FF2B5EF4-FFF2-40B4-BE49-F238E27FC236}">
+                <a16:creationId xmlns:a16="http://schemas.microsoft.com/office/drawing/2014/main" id="{18952644-4033-405D-AF02-3E56C82E47CC}"/>
+              </a:ext>
+            </a:extLst>
+          </p:cNvPr>
+          <p:cNvSpPr txBox="1"/>
+          <p:nvPr/>
+        </p:nvSpPr>
+        <p:spPr>
+          <a:xfrm>
+            <a:off x="423244" y="14929321"/>
             <a:ext cx="4865036" cy="707886"/>
           </a:xfrm>
           <a:prstGeom prst="rect">

</xml_diff>